<commit_message>
add spring cloud support
</commit_message>
<xml_diff>
--- a/doc/XXL-JOB架构图.pptx
+++ b/doc/XXL-JOB架构图.pptx
@@ -5,7 +5,7 @@
     <p:sldMasterId id="2147483648" r:id="rId1"/>
   </p:sldMasterIdLst>
   <p:notesMasterIdLst>
-    <p:notesMasterId r:id="rId11"/>
+    <p:notesMasterId r:id="rId12"/>
   </p:notesMasterIdLst>
   <p:sldIdLst>
     <p:sldId id="259" r:id="rId2"/>
@@ -17,6 +17,7 @@
     <p:sldId id="266" r:id="rId8"/>
     <p:sldId id="267" r:id="rId9"/>
     <p:sldId id="263" r:id="rId10"/>
+    <p:sldId id="268" r:id="rId11"/>
   </p:sldIdLst>
   <p:sldSz cx="12192000" cy="6858000"/>
   <p:notesSz cx="6858000" cy="9144000"/>
@@ -205,7 +206,7 @@
           <a:p>
             <a:fld id="{D2A48B96-639E-45A3-A0BA-2464DFDB1FAA}" type="datetimeFigureOut">
               <a:rPr lang="zh-CN" altLang="en-US" smtClean="0"/>
-              <a:t>2018/11/2</a:t>
+              <a:t>2019/10/11</a:t>
             </a:fld>
             <a:endParaRPr lang="zh-CN" altLang="en-US"/>
           </a:p>
@@ -1878,6 +1879,258 @@
 </p:notes>
 </file>
 
+<file path=ppt/notesSlides/notesSlide8.xml><?xml version="1.0" encoding="utf-8"?>
+<p:notes xmlns:a="http://schemas.openxmlformats.org/drawingml/2006/main" xmlns:r="http://schemas.openxmlformats.org/officeDocument/2006/relationships" xmlns:p="http://schemas.openxmlformats.org/presentationml/2006/main">
+  <p:cSld>
+    <p:spTree>
+      <p:nvGrpSpPr>
+        <p:cNvPr id="1" name=""/>
+        <p:cNvGrpSpPr/>
+        <p:nvPr/>
+      </p:nvGrpSpPr>
+      <p:grpSpPr>
+        <a:xfrm>
+          <a:off x="0" y="0"/>
+          <a:ext cx="0" cy="0"/>
+          <a:chOff x="0" y="0"/>
+          <a:chExt cx="0" cy="0"/>
+        </a:xfrm>
+      </p:grpSpPr>
+      <p:sp>
+        <p:nvSpPr>
+          <p:cNvPr id="8193" name="幻灯片图像占位符 1"/>
+          <p:cNvSpPr>
+            <a:spLocks noGrp="1" noRot="1" noChangeAspect="1" noTextEdit="1"/>
+          </p:cNvSpPr>
+          <p:nvPr>
+            <p:ph type="sldImg"/>
+          </p:nvPr>
+        </p:nvSpPr>
+        <p:spPr bwMode="auto">
+          <a:noFill/>
+          <a:ln>
+            <a:solidFill>
+              <a:srgbClr val="000000"/>
+            </a:solidFill>
+            <a:miter lim="800000"/>
+          </a:ln>
+          <a:extLst>
+            <a:ext uri="{909E8E84-426E-40DD-AFC4-6F175D3DCCD1}">
+              <a14:hiddenFill xmlns:a14="http://schemas.microsoft.com/office/drawing/2010/main">
+                <a:solidFill>
+                  <a:srgbClr val="FFFFFF"/>
+                </a:solidFill>
+              </a14:hiddenFill>
+            </a:ext>
+          </a:extLst>
+        </p:spPr>
+      </p:sp>
+      <p:sp>
+        <p:nvSpPr>
+          <p:cNvPr id="8194" name="备注占位符 2"/>
+          <p:cNvSpPr>
+            <a:spLocks noGrp="1"/>
+          </p:cNvSpPr>
+          <p:nvPr>
+            <p:ph type="body" idx="1"/>
+          </p:nvPr>
+        </p:nvSpPr>
+        <p:spPr bwMode="auto">
+          <a:noFill/>
+          <a:extLst>
+            <a:ext uri="{909E8E84-426E-40DD-AFC4-6F175D3DCCD1}">
+              <a14:hiddenFill xmlns:a14="http://schemas.microsoft.com/office/drawing/2010/main">
+                <a:solidFill>
+                  <a:srgbClr val="FFFFFF"/>
+                </a:solidFill>
+              </a14:hiddenFill>
+            </a:ext>
+            <a:ext uri="{91240B29-F687-4F45-9708-019B960494DF}">
+              <a14:hiddenLine xmlns:a14="http://schemas.microsoft.com/office/drawing/2010/main" w="9525">
+                <a:solidFill>
+                  <a:srgbClr val="000000"/>
+                </a:solidFill>
+                <a:miter lim="800000"/>
+                <a:headEnd/>
+                <a:tailEnd/>
+              </a14:hiddenLine>
+            </a:ext>
+          </a:extLst>
+        </p:spPr>
+        <p:txBody>
+          <a:bodyPr/>
+          <a:lstStyle/>
+          <a:p>
+            <a:endParaRPr kumimoji="0" lang="zh-CN" altLang="en-US" dirty="0">
+              <a:latin typeface="Arial" panose="020B0604020202020204" pitchFamily="34" charset="0"/>
+              <a:ea typeface="MS PGothic" panose="020B0600070205080204" charset="-128"/>
+            </a:endParaRPr>
+          </a:p>
+        </p:txBody>
+      </p:sp>
+      <p:sp>
+        <p:nvSpPr>
+          <p:cNvPr id="8195" name="灯片编号占位符 3"/>
+          <p:cNvSpPr>
+            <a:spLocks noGrp="1"/>
+          </p:cNvSpPr>
+          <p:nvPr>
+            <p:ph type="sldNum" sz="quarter" idx="5"/>
+          </p:nvPr>
+        </p:nvSpPr>
+        <p:spPr bwMode="auto">
+          <a:noFill/>
+          <a:extLst>
+            <a:ext uri="{909E8E84-426E-40DD-AFC4-6F175D3DCCD1}">
+              <a14:hiddenFill xmlns:a14="http://schemas.microsoft.com/office/drawing/2010/main">
+                <a:solidFill>
+                  <a:srgbClr val="FFFFFF"/>
+                </a:solidFill>
+              </a14:hiddenFill>
+            </a:ext>
+            <a:ext uri="{91240B29-F687-4F45-9708-019B960494DF}">
+              <a14:hiddenLine xmlns:a14="http://schemas.microsoft.com/office/drawing/2010/main" w="9525">
+                <a:solidFill>
+                  <a:srgbClr val="000000"/>
+                </a:solidFill>
+                <a:miter lim="800000"/>
+                <a:headEnd/>
+                <a:tailEnd/>
+              </a14:hiddenLine>
+            </a:ext>
+          </a:extLst>
+        </p:spPr>
+        <p:txBody>
+          <a:bodyPr/>
+          <a:lstStyle>
+            <a:lvl1pPr>
+              <a:defRPr sz="2400">
+                <a:solidFill>
+                  <a:schemeClr val="tx1"/>
+                </a:solidFill>
+                <a:latin typeface="Arial" panose="020B0604020202020204" pitchFamily="34" charset="0"/>
+                <a:ea typeface="宋体" panose="02010600030101010101" pitchFamily="2" charset="-122"/>
+              </a:defRPr>
+            </a:lvl1pPr>
+            <a:lvl2pPr marL="742950" indent="-285750">
+              <a:defRPr sz="2400">
+                <a:solidFill>
+                  <a:schemeClr val="tx1"/>
+                </a:solidFill>
+                <a:latin typeface="Arial" panose="020B0604020202020204" pitchFamily="34" charset="0"/>
+                <a:ea typeface="宋体" panose="02010600030101010101" pitchFamily="2" charset="-122"/>
+              </a:defRPr>
+            </a:lvl2pPr>
+            <a:lvl3pPr marL="1143000" indent="-228600">
+              <a:defRPr sz="2400">
+                <a:solidFill>
+                  <a:schemeClr val="tx1"/>
+                </a:solidFill>
+                <a:latin typeface="Arial" panose="020B0604020202020204" pitchFamily="34" charset="0"/>
+                <a:ea typeface="宋体" panose="02010600030101010101" pitchFamily="2" charset="-122"/>
+              </a:defRPr>
+            </a:lvl3pPr>
+            <a:lvl4pPr marL="1600200" indent="-228600">
+              <a:defRPr sz="2400">
+                <a:solidFill>
+                  <a:schemeClr val="tx1"/>
+                </a:solidFill>
+                <a:latin typeface="Arial" panose="020B0604020202020204" pitchFamily="34" charset="0"/>
+                <a:ea typeface="宋体" panose="02010600030101010101" pitchFamily="2" charset="-122"/>
+              </a:defRPr>
+            </a:lvl4pPr>
+            <a:lvl5pPr marL="2057400" indent="-228600">
+              <a:defRPr sz="2400">
+                <a:solidFill>
+                  <a:schemeClr val="tx1"/>
+                </a:solidFill>
+                <a:latin typeface="Arial" panose="020B0604020202020204" pitchFamily="34" charset="0"/>
+                <a:ea typeface="宋体" panose="02010600030101010101" pitchFamily="2" charset="-122"/>
+              </a:defRPr>
+            </a:lvl5pPr>
+            <a:lvl6pPr marL="2514600" indent="-228600" eaLnBrk="0" fontAlgn="base" hangingPunct="0">
+              <a:spcBef>
+                <a:spcPct val="0"/>
+              </a:spcBef>
+              <a:spcAft>
+                <a:spcPct val="0"/>
+              </a:spcAft>
+              <a:defRPr sz="2400">
+                <a:solidFill>
+                  <a:schemeClr val="tx1"/>
+                </a:solidFill>
+                <a:latin typeface="Arial" panose="020B0604020202020204" pitchFamily="34" charset="0"/>
+                <a:ea typeface="宋体" panose="02010600030101010101" pitchFamily="2" charset="-122"/>
+              </a:defRPr>
+            </a:lvl6pPr>
+            <a:lvl7pPr marL="2971800" indent="-228600" eaLnBrk="0" fontAlgn="base" hangingPunct="0">
+              <a:spcBef>
+                <a:spcPct val="0"/>
+              </a:spcBef>
+              <a:spcAft>
+                <a:spcPct val="0"/>
+              </a:spcAft>
+              <a:defRPr sz="2400">
+                <a:solidFill>
+                  <a:schemeClr val="tx1"/>
+                </a:solidFill>
+                <a:latin typeface="Arial" panose="020B0604020202020204" pitchFamily="34" charset="0"/>
+                <a:ea typeface="宋体" panose="02010600030101010101" pitchFamily="2" charset="-122"/>
+              </a:defRPr>
+            </a:lvl7pPr>
+            <a:lvl8pPr marL="3429000" indent="-228600" eaLnBrk="0" fontAlgn="base" hangingPunct="0">
+              <a:spcBef>
+                <a:spcPct val="0"/>
+              </a:spcBef>
+              <a:spcAft>
+                <a:spcPct val="0"/>
+              </a:spcAft>
+              <a:defRPr sz="2400">
+                <a:solidFill>
+                  <a:schemeClr val="tx1"/>
+                </a:solidFill>
+                <a:latin typeface="Arial" panose="020B0604020202020204" pitchFamily="34" charset="0"/>
+                <a:ea typeface="宋体" panose="02010600030101010101" pitchFamily="2" charset="-122"/>
+              </a:defRPr>
+            </a:lvl8pPr>
+            <a:lvl9pPr marL="3886200" indent="-228600" eaLnBrk="0" fontAlgn="base" hangingPunct="0">
+              <a:spcBef>
+                <a:spcPct val="0"/>
+              </a:spcBef>
+              <a:spcAft>
+                <a:spcPct val="0"/>
+              </a:spcAft>
+              <a:defRPr sz="2400">
+                <a:solidFill>
+                  <a:schemeClr val="tx1"/>
+                </a:solidFill>
+                <a:latin typeface="Arial" panose="020B0604020202020204" pitchFamily="34" charset="0"/>
+                <a:ea typeface="宋体" panose="02010600030101010101" pitchFamily="2" charset="-122"/>
+              </a:defRPr>
+            </a:lvl9pPr>
+          </a:lstStyle>
+          <a:p>
+            <a:fld id="{80DF3984-D036-8146-80F3-60605DE9315C}" type="slidenum">
+              <a:rPr lang="zh-CN" altLang="en-US" sz="1200"/>
+              <a:t>10</a:t>
+            </a:fld>
+            <a:endParaRPr lang="zh-CN" altLang="en-US" sz="1200"/>
+          </a:p>
+        </p:txBody>
+      </p:sp>
+    </p:spTree>
+    <p:extLst>
+      <p:ext uri="{BB962C8B-B14F-4D97-AF65-F5344CB8AC3E}">
+        <p14:creationId xmlns:p14="http://schemas.microsoft.com/office/powerpoint/2010/main" val="911974567"/>
+      </p:ext>
+    </p:extLst>
+  </p:cSld>
+  <p:clrMapOvr>
+    <a:masterClrMapping/>
+  </p:clrMapOvr>
+</p:notes>
+</file>
+
 <file path=ppt/slideLayouts/slideLayout1.xml><?xml version="1.0" encoding="utf-8"?>
 <p:sldLayout xmlns:a="http://schemas.openxmlformats.org/drawingml/2006/main" xmlns:r="http://schemas.openxmlformats.org/officeDocument/2006/relationships" xmlns:p="http://schemas.openxmlformats.org/presentationml/2006/main" type="title" preserve="1">
   <p:cSld name="标题幻灯片">
@@ -2009,7 +2262,7 @@
           <a:p>
             <a:fld id="{D997B5FA-0921-464F-AAE1-844C04324D75}" type="datetimeFigureOut">
               <a:rPr lang="zh-CN" altLang="en-US" smtClean="0"/>
-              <a:t>2018/11/2</a:t>
+              <a:t>2019/10/11</a:t>
             </a:fld>
             <a:endParaRPr lang="zh-CN" altLang="en-US"/>
           </a:p>
@@ -2174,7 +2427,7 @@
           <a:p>
             <a:fld id="{D997B5FA-0921-464F-AAE1-844C04324D75}" type="datetimeFigureOut">
               <a:rPr lang="zh-CN" altLang="en-US" smtClean="0"/>
-              <a:t>2018/11/2</a:t>
+              <a:t>2019/10/11</a:t>
             </a:fld>
             <a:endParaRPr lang="zh-CN" altLang="en-US"/>
           </a:p>
@@ -2349,7 +2602,7 @@
           <a:p>
             <a:fld id="{D997B5FA-0921-464F-AAE1-844C04324D75}" type="datetimeFigureOut">
               <a:rPr lang="zh-CN" altLang="en-US" smtClean="0"/>
-              <a:t>2018/11/2</a:t>
+              <a:t>2019/10/11</a:t>
             </a:fld>
             <a:endParaRPr lang="zh-CN" altLang="en-US"/>
           </a:p>
@@ -2514,7 +2767,7 @@
           <a:p>
             <a:fld id="{D997B5FA-0921-464F-AAE1-844C04324D75}" type="datetimeFigureOut">
               <a:rPr lang="zh-CN" altLang="en-US" smtClean="0"/>
-              <a:t>2018/11/2</a:t>
+              <a:t>2019/10/11</a:t>
             </a:fld>
             <a:endParaRPr lang="zh-CN" altLang="en-US"/>
           </a:p>
@@ -2755,7 +3008,7 @@
           <a:p>
             <a:fld id="{D997B5FA-0921-464F-AAE1-844C04324D75}" type="datetimeFigureOut">
               <a:rPr lang="zh-CN" altLang="en-US" smtClean="0"/>
-              <a:t>2018/11/2</a:t>
+              <a:t>2019/10/11</a:t>
             </a:fld>
             <a:endParaRPr lang="zh-CN" altLang="en-US"/>
           </a:p>
@@ -2982,7 +3235,7 @@
           <a:p>
             <a:fld id="{D997B5FA-0921-464F-AAE1-844C04324D75}" type="datetimeFigureOut">
               <a:rPr lang="zh-CN" altLang="en-US" smtClean="0"/>
-              <a:t>2018/11/2</a:t>
+              <a:t>2019/10/11</a:t>
             </a:fld>
             <a:endParaRPr lang="zh-CN" altLang="en-US"/>
           </a:p>
@@ -3344,7 +3597,7 @@
           <a:p>
             <a:fld id="{D997B5FA-0921-464F-AAE1-844C04324D75}" type="datetimeFigureOut">
               <a:rPr lang="zh-CN" altLang="en-US" smtClean="0"/>
-              <a:t>2018/11/2</a:t>
+              <a:t>2019/10/11</a:t>
             </a:fld>
             <a:endParaRPr lang="zh-CN" altLang="en-US"/>
           </a:p>
@@ -3457,7 +3710,7 @@
           <a:p>
             <a:fld id="{D997B5FA-0921-464F-AAE1-844C04324D75}" type="datetimeFigureOut">
               <a:rPr lang="zh-CN" altLang="en-US" smtClean="0"/>
-              <a:t>2018/11/2</a:t>
+              <a:t>2019/10/11</a:t>
             </a:fld>
             <a:endParaRPr lang="zh-CN" altLang="en-US"/>
           </a:p>
@@ -3547,7 +3800,7 @@
           <a:p>
             <a:fld id="{D997B5FA-0921-464F-AAE1-844C04324D75}" type="datetimeFigureOut">
               <a:rPr lang="zh-CN" altLang="en-US" smtClean="0"/>
-              <a:t>2018/11/2</a:t>
+              <a:t>2019/10/11</a:t>
             </a:fld>
             <a:endParaRPr lang="zh-CN" altLang="en-US"/>
           </a:p>
@@ -3819,7 +4072,7 @@
           <a:p>
             <a:fld id="{D997B5FA-0921-464F-AAE1-844C04324D75}" type="datetimeFigureOut">
               <a:rPr lang="zh-CN" altLang="en-US" smtClean="0"/>
-              <a:t>2018/11/2</a:t>
+              <a:t>2019/10/11</a:t>
             </a:fld>
             <a:endParaRPr lang="zh-CN" altLang="en-US"/>
           </a:p>
@@ -4067,7 +4320,7 @@
           <a:p>
             <a:fld id="{D997B5FA-0921-464F-AAE1-844C04324D75}" type="datetimeFigureOut">
               <a:rPr lang="zh-CN" altLang="en-US" smtClean="0"/>
-              <a:t>2018/11/2</a:t>
+              <a:t>2019/10/11</a:t>
             </a:fld>
             <a:endParaRPr lang="zh-CN" altLang="en-US"/>
           </a:p>
@@ -4275,7 +4528,7 @@
           <a:p>
             <a:fld id="{D997B5FA-0921-464F-AAE1-844C04324D75}" type="datetimeFigureOut">
               <a:rPr lang="zh-CN" altLang="en-US" smtClean="0"/>
-              <a:t>2018/11/2</a:t>
+              <a:t>2019/10/11</a:t>
             </a:fld>
             <a:endParaRPr lang="zh-CN" altLang="en-US"/>
           </a:p>
@@ -6126,6 +6379,2634 @@
 </p:sld>
 </file>
 
+<file path=ppt/slides/slide10.xml><?xml version="1.0" encoding="utf-8"?>
+<p:sld xmlns:a="http://schemas.openxmlformats.org/drawingml/2006/main" xmlns:r="http://schemas.openxmlformats.org/officeDocument/2006/relationships" xmlns:p="http://schemas.openxmlformats.org/presentationml/2006/main">
+  <p:cSld>
+    <p:spTree>
+      <p:nvGrpSpPr>
+        <p:cNvPr id="1" name=""/>
+        <p:cNvGrpSpPr/>
+        <p:nvPr/>
+      </p:nvGrpSpPr>
+      <p:grpSpPr>
+        <a:xfrm>
+          <a:off x="0" y="0"/>
+          <a:ext cx="0" cy="0"/>
+          <a:chOff x="0" y="0"/>
+          <a:chExt cx="0" cy="0"/>
+        </a:xfrm>
+      </p:grpSpPr>
+      <p:sp>
+        <p:nvSpPr>
+          <p:cNvPr id="14" name="矩形 13"/>
+          <p:cNvSpPr/>
+          <p:nvPr/>
+        </p:nvSpPr>
+        <p:spPr>
+          <a:xfrm>
+            <a:off x="622491" y="576163"/>
+            <a:ext cx="5778309" cy="5176329"/>
+          </a:xfrm>
+          <a:prstGeom prst="rect">
+            <a:avLst/>
+          </a:prstGeom>
+          <a:solidFill>
+            <a:srgbClr val="9FC2E8"/>
+          </a:solidFill>
+          <a:ln>
+            <a:noFill/>
+          </a:ln>
+        </p:spPr>
+        <p:style>
+          <a:lnRef idx="2">
+            <a:schemeClr val="accent1">
+              <a:shade val="50000"/>
+            </a:schemeClr>
+          </a:lnRef>
+          <a:fillRef idx="1">
+            <a:schemeClr val="accent1"/>
+          </a:fillRef>
+          <a:effectRef idx="0">
+            <a:schemeClr val="accent1"/>
+          </a:effectRef>
+          <a:fontRef idx="minor">
+            <a:schemeClr val="lt1"/>
+          </a:fontRef>
+        </p:style>
+        <p:txBody>
+          <a:bodyPr anchor="b"/>
+          <a:lstStyle/>
+          <a:p>
+            <a:pPr algn="ctr">
+              <a:defRPr/>
+            </a:pPr>
+            <a:r>
+              <a:rPr kumimoji="1" lang="zh-CN" altLang="en-US" sz="1600" b="1" dirty="0">
+                <a:solidFill>
+                  <a:schemeClr val="tx1"/>
+                </a:solidFill>
+                <a:latin typeface="Heiti SC Light" charset="-122"/>
+                <a:ea typeface="Heiti SC Light" charset="-122"/>
+                <a:cs typeface="Heiti SC Light" charset="-122"/>
+              </a:rPr>
+              <a:t>调度中心</a:t>
+            </a:r>
+          </a:p>
+        </p:txBody>
+      </p:sp>
+      <p:sp>
+        <p:nvSpPr>
+          <p:cNvPr id="7" name="进程 6"/>
+          <p:cNvSpPr/>
+          <p:nvPr/>
+        </p:nvSpPr>
+        <p:spPr>
+          <a:xfrm>
+            <a:off x="720867" y="4786674"/>
+            <a:ext cx="3336094" cy="442510"/>
+          </a:xfrm>
+          <a:prstGeom prst="flowChartProcess">
+            <a:avLst/>
+          </a:prstGeom>
+        </p:spPr>
+        <p:style>
+          <a:lnRef idx="1">
+            <a:schemeClr val="accent4"/>
+          </a:lnRef>
+          <a:fillRef idx="2">
+            <a:schemeClr val="accent4"/>
+          </a:fillRef>
+          <a:effectRef idx="1">
+            <a:schemeClr val="accent4"/>
+          </a:effectRef>
+          <a:fontRef idx="minor">
+            <a:schemeClr val="dk1"/>
+          </a:fontRef>
+        </p:style>
+        <p:txBody>
+          <a:bodyPr anchor="ctr"/>
+          <a:lstStyle/>
+          <a:p>
+            <a:pPr algn="ctr">
+              <a:defRPr/>
+            </a:pPr>
+            <a:r>
+              <a:rPr kumimoji="1" lang="zh-CN" altLang="en-US" sz="1600" b="1" dirty="0" smtClean="0">
+                <a:latin typeface="Heiti SC Light" charset="-122"/>
+                <a:ea typeface="Heiti SC Light" charset="-122"/>
+                <a:cs typeface="Heiti SC Light" charset="-122"/>
+              </a:rPr>
+              <a:t>数据中心</a:t>
+            </a:r>
+            <a:endParaRPr kumimoji="1" lang="zh-CN" altLang="en-US" sz="1600" b="1" dirty="0">
+              <a:latin typeface="Heiti SC Light" charset="-122"/>
+              <a:ea typeface="Heiti SC Light" charset="-122"/>
+              <a:cs typeface="Heiti SC Light" charset="-122"/>
+            </a:endParaRPr>
+          </a:p>
+        </p:txBody>
+      </p:sp>
+      <p:sp>
+        <p:nvSpPr>
+          <p:cNvPr id="29" name="可选流程 28"/>
+          <p:cNvSpPr/>
+          <p:nvPr/>
+        </p:nvSpPr>
+        <p:spPr>
+          <a:xfrm>
+            <a:off x="4271056" y="4568832"/>
+            <a:ext cx="1659412" cy="572325"/>
+          </a:xfrm>
+          <a:prstGeom prst="flowChartAlternateProcess">
+            <a:avLst/>
+          </a:prstGeom>
+          <a:solidFill>
+            <a:srgbClr val="9379B3"/>
+          </a:solidFill>
+        </p:spPr>
+        <p:style>
+          <a:lnRef idx="0">
+            <a:schemeClr val="accent1"/>
+          </a:lnRef>
+          <a:fillRef idx="3">
+            <a:schemeClr val="accent1"/>
+          </a:fillRef>
+          <a:effectRef idx="3">
+            <a:schemeClr val="accent1"/>
+          </a:effectRef>
+          <a:fontRef idx="minor">
+            <a:schemeClr val="lt1"/>
+          </a:fontRef>
+        </p:style>
+        <p:txBody>
+          <a:bodyPr anchor="ctr"/>
+          <a:lstStyle/>
+          <a:p>
+            <a:pPr algn="ctr">
+              <a:defRPr/>
+            </a:pPr>
+            <a:r>
+              <a:rPr kumimoji="1" lang="zh-CN" altLang="en-US" sz="1400" dirty="0" smtClean="0">
+                <a:latin typeface="Heiti SC Light" charset="-122"/>
+                <a:ea typeface="Heiti SC Light" charset="-122"/>
+                <a:cs typeface="Heiti SC Light" charset="-122"/>
+              </a:rPr>
+              <a:t>注册服务</a:t>
+            </a:r>
+          </a:p>
+        </p:txBody>
+      </p:sp>
+      <p:sp>
+        <p:nvSpPr>
+          <p:cNvPr id="4" name="矩形 3"/>
+          <p:cNvSpPr/>
+          <p:nvPr/>
+        </p:nvSpPr>
+        <p:spPr>
+          <a:xfrm>
+            <a:off x="720867" y="688297"/>
+            <a:ext cx="1672839" cy="1961502"/>
+          </a:xfrm>
+          <a:prstGeom prst="rect">
+            <a:avLst/>
+          </a:prstGeom>
+          <a:solidFill>
+            <a:srgbClr val="E0EBFF"/>
+          </a:solidFill>
+          <a:ln>
+            <a:noFill/>
+          </a:ln>
+        </p:spPr>
+        <p:style>
+          <a:lnRef idx="1">
+            <a:schemeClr val="accent1"/>
+          </a:lnRef>
+          <a:fillRef idx="2">
+            <a:schemeClr val="accent1"/>
+          </a:fillRef>
+          <a:effectRef idx="1">
+            <a:schemeClr val="accent1"/>
+          </a:effectRef>
+          <a:fontRef idx="minor">
+            <a:schemeClr val="dk1"/>
+          </a:fontRef>
+        </p:style>
+        <p:txBody>
+          <a:bodyPr anchor="t"/>
+          <a:lstStyle/>
+          <a:p>
+            <a:pPr algn="ctr">
+              <a:defRPr/>
+            </a:pPr>
+            <a:r>
+              <a:rPr kumimoji="1" lang="zh-CN" altLang="en-US" sz="1400" b="1" dirty="0" smtClean="0">
+                <a:latin typeface="Heiti SC Light" charset="-122"/>
+                <a:ea typeface="Heiti SC Light" charset="-122"/>
+                <a:cs typeface="Heiti SC Light" charset="-122"/>
+              </a:rPr>
+              <a:t>任务管理</a:t>
+            </a:r>
+          </a:p>
+        </p:txBody>
+      </p:sp>
+      <p:sp>
+        <p:nvSpPr>
+          <p:cNvPr id="5" name="可选流程 4"/>
+          <p:cNvSpPr/>
+          <p:nvPr/>
+        </p:nvSpPr>
+        <p:spPr>
+          <a:xfrm>
+            <a:off x="799893" y="1015627"/>
+            <a:ext cx="1535914" cy="251629"/>
+          </a:xfrm>
+          <a:prstGeom prst="flowChartAlternateProcess">
+            <a:avLst/>
+          </a:prstGeom>
+          <a:solidFill>
+            <a:srgbClr val="6095C9"/>
+          </a:solidFill>
+        </p:spPr>
+        <p:style>
+          <a:lnRef idx="0">
+            <a:schemeClr val="accent1"/>
+          </a:lnRef>
+          <a:fillRef idx="3">
+            <a:schemeClr val="accent1"/>
+          </a:fillRef>
+          <a:effectRef idx="3">
+            <a:schemeClr val="accent1"/>
+          </a:effectRef>
+          <a:fontRef idx="minor">
+            <a:schemeClr val="lt1"/>
+          </a:fontRef>
+        </p:style>
+        <p:txBody>
+          <a:bodyPr anchor="ctr"/>
+          <a:lstStyle/>
+          <a:p>
+            <a:pPr>
+              <a:defRPr/>
+            </a:pPr>
+            <a:r>
+              <a:rPr kumimoji="1" lang="zh-CN" altLang="en-US" sz="1400" dirty="0" smtClean="0">
+                <a:latin typeface="Heiti SC Light" charset="-122"/>
+                <a:ea typeface="Heiti SC Light" charset="-122"/>
+                <a:cs typeface="Heiti SC Light" charset="-122"/>
+              </a:rPr>
+              <a:t>执行器</a:t>
+            </a:r>
+            <a:endParaRPr kumimoji="1" lang="zh-CN" altLang="en-US" sz="1400" dirty="0">
+              <a:latin typeface="Heiti SC Light" charset="-122"/>
+              <a:ea typeface="Heiti SC Light" charset="-122"/>
+              <a:cs typeface="Heiti SC Light" charset="-122"/>
+            </a:endParaRPr>
+          </a:p>
+        </p:txBody>
+      </p:sp>
+      <p:sp>
+        <p:nvSpPr>
+          <p:cNvPr id="60" name="可选流程 59"/>
+          <p:cNvSpPr/>
+          <p:nvPr/>
+        </p:nvSpPr>
+        <p:spPr>
+          <a:xfrm>
+            <a:off x="799893" y="1406309"/>
+            <a:ext cx="1535914" cy="281598"/>
+          </a:xfrm>
+          <a:prstGeom prst="flowChartAlternateProcess">
+            <a:avLst/>
+          </a:prstGeom>
+          <a:solidFill>
+            <a:srgbClr val="6095C9"/>
+          </a:solidFill>
+        </p:spPr>
+        <p:style>
+          <a:lnRef idx="0">
+            <a:schemeClr val="accent1"/>
+          </a:lnRef>
+          <a:fillRef idx="3">
+            <a:schemeClr val="accent1"/>
+          </a:fillRef>
+          <a:effectRef idx="3">
+            <a:schemeClr val="accent1"/>
+          </a:effectRef>
+          <a:fontRef idx="minor">
+            <a:schemeClr val="lt1"/>
+          </a:fontRef>
+        </p:style>
+        <p:txBody>
+          <a:bodyPr anchor="ctr"/>
+          <a:lstStyle/>
+          <a:p>
+            <a:pPr>
+              <a:defRPr/>
+            </a:pPr>
+            <a:r>
+              <a:rPr kumimoji="1" lang="zh-CN" altLang="en-US" sz="1400" dirty="0">
+                <a:latin typeface="Heiti SC Light" charset="-122"/>
+                <a:ea typeface="Heiti SC Light" charset="-122"/>
+                <a:cs typeface="Heiti SC Light" charset="-122"/>
+              </a:rPr>
+              <a:t>任务</a:t>
+            </a:r>
+            <a:r>
+              <a:rPr kumimoji="1" lang="zh-CN" altLang="en-US" sz="1400" dirty="0" smtClean="0">
+                <a:latin typeface="Heiti SC Light" charset="-122"/>
+                <a:ea typeface="Heiti SC Light" charset="-122"/>
+                <a:cs typeface="Heiti SC Light" charset="-122"/>
+              </a:rPr>
+              <a:t>模式</a:t>
+            </a:r>
+            <a:endParaRPr kumimoji="1" lang="zh-CN" altLang="en-US" sz="1400" dirty="0">
+              <a:latin typeface="Heiti SC Light" charset="-122"/>
+              <a:ea typeface="Heiti SC Light" charset="-122"/>
+              <a:cs typeface="Heiti SC Light" charset="-122"/>
+            </a:endParaRPr>
+          </a:p>
+        </p:txBody>
+      </p:sp>
+      <p:sp>
+        <p:nvSpPr>
+          <p:cNvPr id="62" name="可选流程 61"/>
+          <p:cNvSpPr/>
+          <p:nvPr/>
+        </p:nvSpPr>
+        <p:spPr>
+          <a:xfrm>
+            <a:off x="799893" y="1830646"/>
+            <a:ext cx="1535914" cy="255324"/>
+          </a:xfrm>
+          <a:prstGeom prst="flowChartAlternateProcess">
+            <a:avLst/>
+          </a:prstGeom>
+          <a:solidFill>
+            <a:srgbClr val="6095C9"/>
+          </a:solidFill>
+        </p:spPr>
+        <p:style>
+          <a:lnRef idx="0">
+            <a:schemeClr val="accent1"/>
+          </a:lnRef>
+          <a:fillRef idx="3">
+            <a:schemeClr val="accent1"/>
+          </a:fillRef>
+          <a:effectRef idx="3">
+            <a:schemeClr val="accent1"/>
+          </a:effectRef>
+          <a:fontRef idx="minor">
+            <a:schemeClr val="lt1"/>
+          </a:fontRef>
+        </p:style>
+        <p:txBody>
+          <a:bodyPr anchor="ctr"/>
+          <a:lstStyle/>
+          <a:p>
+            <a:pPr>
+              <a:defRPr/>
+            </a:pPr>
+            <a:r>
+              <a:rPr kumimoji="1" lang="en-US" altLang="zh-CN" sz="1400" dirty="0">
+                <a:latin typeface="Heiti SC Light" charset="-122"/>
+                <a:ea typeface="Heiti SC Light" charset="-122"/>
+                <a:cs typeface="Heiti SC Light" charset="-122"/>
+              </a:rPr>
+              <a:t>JobHandler</a:t>
+            </a:r>
+            <a:endParaRPr kumimoji="1" lang="zh-CN" altLang="en-US" sz="1400" dirty="0">
+              <a:latin typeface="Heiti SC Light" charset="-122"/>
+              <a:ea typeface="Heiti SC Light" charset="-122"/>
+              <a:cs typeface="Heiti SC Light" charset="-122"/>
+            </a:endParaRPr>
+          </a:p>
+        </p:txBody>
+      </p:sp>
+      <p:sp>
+        <p:nvSpPr>
+          <p:cNvPr id="63" name="可选流程 62"/>
+          <p:cNvSpPr/>
+          <p:nvPr/>
+        </p:nvSpPr>
+        <p:spPr>
+          <a:xfrm>
+            <a:off x="799893" y="2206727"/>
+            <a:ext cx="1535914" cy="274201"/>
+          </a:xfrm>
+          <a:prstGeom prst="flowChartAlternateProcess">
+            <a:avLst/>
+          </a:prstGeom>
+          <a:solidFill>
+            <a:srgbClr val="6095C9"/>
+          </a:solidFill>
+        </p:spPr>
+        <p:style>
+          <a:lnRef idx="0">
+            <a:schemeClr val="accent1"/>
+          </a:lnRef>
+          <a:fillRef idx="3">
+            <a:schemeClr val="accent1"/>
+          </a:fillRef>
+          <a:effectRef idx="3">
+            <a:schemeClr val="accent1"/>
+          </a:effectRef>
+          <a:fontRef idx="minor">
+            <a:schemeClr val="lt1"/>
+          </a:fontRef>
+        </p:style>
+        <p:txBody>
+          <a:bodyPr anchor="ctr"/>
+          <a:lstStyle/>
+          <a:p>
+            <a:pPr>
+              <a:defRPr/>
+            </a:pPr>
+            <a:r>
+              <a:rPr kumimoji="1" lang="en-US" altLang="zh-CN" sz="1400" dirty="0" smtClean="0">
+                <a:latin typeface="Heiti SC Light" charset="-122"/>
+                <a:ea typeface="Heiti SC Light" charset="-122"/>
+                <a:cs typeface="Heiti SC Light" charset="-122"/>
+              </a:rPr>
+              <a:t>……</a:t>
+            </a:r>
+            <a:endParaRPr kumimoji="1" lang="zh-CN" altLang="en-US" sz="1400" dirty="0">
+              <a:latin typeface="Heiti SC Light" charset="-122"/>
+              <a:ea typeface="Heiti SC Light" charset="-122"/>
+              <a:cs typeface="Heiti SC Light" charset="-122"/>
+            </a:endParaRPr>
+          </a:p>
+        </p:txBody>
+      </p:sp>
+      <p:sp>
+        <p:nvSpPr>
+          <p:cNvPr id="10" name="矩形 9"/>
+          <p:cNvSpPr/>
+          <p:nvPr/>
+        </p:nvSpPr>
+        <p:spPr>
+          <a:xfrm>
+            <a:off x="2388914" y="688297"/>
+            <a:ext cx="1668047" cy="1961502"/>
+          </a:xfrm>
+          <a:prstGeom prst="rect">
+            <a:avLst/>
+          </a:prstGeom>
+          <a:solidFill>
+            <a:srgbClr val="DEF7FF"/>
+          </a:solidFill>
+          <a:ln>
+            <a:noFill/>
+          </a:ln>
+        </p:spPr>
+        <p:style>
+          <a:lnRef idx="1">
+            <a:schemeClr val="accent1"/>
+          </a:lnRef>
+          <a:fillRef idx="2">
+            <a:schemeClr val="accent1"/>
+          </a:fillRef>
+          <a:effectRef idx="1">
+            <a:schemeClr val="accent1"/>
+          </a:effectRef>
+          <a:fontRef idx="minor">
+            <a:schemeClr val="dk1"/>
+          </a:fontRef>
+        </p:style>
+        <p:txBody>
+          <a:bodyPr anchor="t"/>
+          <a:lstStyle/>
+          <a:p>
+            <a:pPr algn="ctr">
+              <a:defRPr/>
+            </a:pPr>
+            <a:r>
+              <a:rPr kumimoji="1" lang="zh-CN" altLang="en-US" sz="1400" b="1" dirty="0" smtClean="0">
+                <a:latin typeface="Heiti SC Light" charset="-122"/>
+                <a:ea typeface="Heiti SC Light" charset="-122"/>
+                <a:cs typeface="Heiti SC Light" charset="-122"/>
+              </a:rPr>
+              <a:t>执行器管理</a:t>
+            </a:r>
+            <a:endParaRPr kumimoji="1" lang="zh-CN" altLang="en-US" sz="1400" b="1" dirty="0">
+              <a:latin typeface="Heiti SC Light" charset="-122"/>
+              <a:ea typeface="Heiti SC Light" charset="-122"/>
+              <a:cs typeface="Heiti SC Light" charset="-122"/>
+            </a:endParaRPr>
+          </a:p>
+        </p:txBody>
+      </p:sp>
+      <p:sp>
+        <p:nvSpPr>
+          <p:cNvPr id="40" name="可选流程 39"/>
+          <p:cNvSpPr/>
+          <p:nvPr/>
+        </p:nvSpPr>
+        <p:spPr>
+          <a:xfrm>
+            <a:off x="2491980" y="1009669"/>
+            <a:ext cx="1432847" cy="272004"/>
+          </a:xfrm>
+          <a:prstGeom prst="flowChartAlternateProcess">
+            <a:avLst/>
+          </a:prstGeom>
+          <a:solidFill>
+            <a:srgbClr val="4BACC6"/>
+          </a:solidFill>
+        </p:spPr>
+        <p:style>
+          <a:lnRef idx="0">
+            <a:schemeClr val="accent1"/>
+          </a:lnRef>
+          <a:fillRef idx="3">
+            <a:schemeClr val="accent1"/>
+          </a:fillRef>
+          <a:effectRef idx="3">
+            <a:schemeClr val="accent1"/>
+          </a:effectRef>
+          <a:fontRef idx="minor">
+            <a:schemeClr val="lt1"/>
+          </a:fontRef>
+        </p:style>
+        <p:txBody>
+          <a:bodyPr anchor="ctr"/>
+          <a:lstStyle/>
+          <a:p>
+            <a:pPr>
+              <a:defRPr/>
+            </a:pPr>
+            <a:r>
+              <a:rPr kumimoji="1" lang="zh-CN" altLang="en-US" sz="1400" dirty="0" smtClean="0">
+                <a:latin typeface="Heiti SC Light" charset="-122"/>
+                <a:ea typeface="Heiti SC Light" charset="-122"/>
+                <a:cs typeface="Heiti SC Light" charset="-122"/>
+              </a:rPr>
+              <a:t>注册方式</a:t>
+            </a:r>
+            <a:endParaRPr kumimoji="1" lang="zh-CN" altLang="en-US" sz="1400" dirty="0">
+              <a:latin typeface="Heiti SC Light" charset="-122"/>
+              <a:ea typeface="Heiti SC Light" charset="-122"/>
+              <a:cs typeface="Heiti SC Light" charset="-122"/>
+            </a:endParaRPr>
+          </a:p>
+        </p:txBody>
+      </p:sp>
+      <p:sp>
+        <p:nvSpPr>
+          <p:cNvPr id="66" name="可选流程 65"/>
+          <p:cNvSpPr/>
+          <p:nvPr/>
+        </p:nvSpPr>
+        <p:spPr>
+          <a:xfrm>
+            <a:off x="2491979" y="1400460"/>
+            <a:ext cx="1432847" cy="275832"/>
+          </a:xfrm>
+          <a:prstGeom prst="flowChartAlternateProcess">
+            <a:avLst/>
+          </a:prstGeom>
+          <a:solidFill>
+            <a:srgbClr val="4BACC6"/>
+          </a:solidFill>
+        </p:spPr>
+        <p:style>
+          <a:lnRef idx="0">
+            <a:schemeClr val="accent1"/>
+          </a:lnRef>
+          <a:fillRef idx="3">
+            <a:schemeClr val="accent1"/>
+          </a:fillRef>
+          <a:effectRef idx="3">
+            <a:schemeClr val="accent1"/>
+          </a:effectRef>
+          <a:fontRef idx="minor">
+            <a:schemeClr val="lt1"/>
+          </a:fontRef>
+        </p:style>
+        <p:txBody>
+          <a:bodyPr anchor="ctr"/>
+          <a:lstStyle/>
+          <a:p>
+            <a:pPr>
+              <a:defRPr/>
+            </a:pPr>
+            <a:r>
+              <a:rPr kumimoji="1" lang="en-US" altLang="zh-CN" sz="1400" dirty="0" smtClean="0">
+                <a:latin typeface="Heiti SC Light" charset="-122"/>
+                <a:ea typeface="Heiti SC Light" charset="-122"/>
+                <a:cs typeface="Heiti SC Light" charset="-122"/>
+              </a:rPr>
+              <a:t>AppName</a:t>
+            </a:r>
+            <a:endParaRPr kumimoji="1" lang="zh-CN" altLang="en-US" sz="1400" dirty="0">
+              <a:latin typeface="Heiti SC Light" charset="-122"/>
+              <a:ea typeface="Heiti SC Light" charset="-122"/>
+              <a:cs typeface="Heiti SC Light" charset="-122"/>
+            </a:endParaRPr>
+          </a:p>
+        </p:txBody>
+      </p:sp>
+      <p:sp>
+        <p:nvSpPr>
+          <p:cNvPr id="67" name="可选流程 66"/>
+          <p:cNvSpPr/>
+          <p:nvPr/>
+        </p:nvSpPr>
+        <p:spPr>
+          <a:xfrm>
+            <a:off x="2491978" y="1834820"/>
+            <a:ext cx="1432847" cy="263850"/>
+          </a:xfrm>
+          <a:prstGeom prst="flowChartAlternateProcess">
+            <a:avLst/>
+          </a:prstGeom>
+          <a:solidFill>
+            <a:srgbClr val="4BACC6"/>
+          </a:solidFill>
+        </p:spPr>
+        <p:style>
+          <a:lnRef idx="0">
+            <a:schemeClr val="accent1"/>
+          </a:lnRef>
+          <a:fillRef idx="3">
+            <a:schemeClr val="accent1"/>
+          </a:fillRef>
+          <a:effectRef idx="3">
+            <a:schemeClr val="accent1"/>
+          </a:effectRef>
+          <a:fontRef idx="minor">
+            <a:schemeClr val="lt1"/>
+          </a:fontRef>
+        </p:style>
+        <p:txBody>
+          <a:bodyPr anchor="ctr"/>
+          <a:lstStyle/>
+          <a:p>
+            <a:pPr>
+              <a:defRPr/>
+            </a:pPr>
+            <a:r>
+              <a:rPr kumimoji="1" lang="zh-CN" altLang="en-US" sz="1400" dirty="0" smtClean="0">
+                <a:latin typeface="Heiti SC Light" charset="-122"/>
+                <a:ea typeface="Heiti SC Light" charset="-122"/>
+                <a:cs typeface="Heiti SC Light" charset="-122"/>
+              </a:rPr>
+              <a:t>机器地址列表</a:t>
+            </a:r>
+            <a:endParaRPr kumimoji="1" lang="zh-CN" altLang="en-US" sz="1400" dirty="0">
+              <a:latin typeface="Heiti SC Light" charset="-122"/>
+              <a:ea typeface="Heiti SC Light" charset="-122"/>
+              <a:cs typeface="Heiti SC Light" charset="-122"/>
+            </a:endParaRPr>
+          </a:p>
+        </p:txBody>
+      </p:sp>
+      <p:sp>
+        <p:nvSpPr>
+          <p:cNvPr id="68" name="可选流程 67"/>
+          <p:cNvSpPr/>
+          <p:nvPr/>
+        </p:nvSpPr>
+        <p:spPr>
+          <a:xfrm>
+            <a:off x="2491977" y="2217078"/>
+            <a:ext cx="1432847" cy="263850"/>
+          </a:xfrm>
+          <a:prstGeom prst="flowChartAlternateProcess">
+            <a:avLst/>
+          </a:prstGeom>
+          <a:solidFill>
+            <a:srgbClr val="4BACC6"/>
+          </a:solidFill>
+        </p:spPr>
+        <p:style>
+          <a:lnRef idx="0">
+            <a:schemeClr val="accent1"/>
+          </a:lnRef>
+          <a:fillRef idx="3">
+            <a:schemeClr val="accent1"/>
+          </a:fillRef>
+          <a:effectRef idx="3">
+            <a:schemeClr val="accent1"/>
+          </a:effectRef>
+          <a:fontRef idx="minor">
+            <a:schemeClr val="lt1"/>
+          </a:fontRef>
+        </p:style>
+        <p:txBody>
+          <a:bodyPr anchor="ctr"/>
+          <a:lstStyle/>
+          <a:p>
+            <a:pPr>
+              <a:defRPr/>
+            </a:pPr>
+            <a:r>
+              <a:rPr kumimoji="1" lang="en-US" altLang="zh-CN" sz="1400" dirty="0" smtClean="0">
+                <a:latin typeface="Heiti SC Light" charset="-122"/>
+                <a:ea typeface="Heiti SC Light" charset="-122"/>
+                <a:cs typeface="Heiti SC Light" charset="-122"/>
+              </a:rPr>
+              <a:t>……</a:t>
+            </a:r>
+            <a:endParaRPr kumimoji="1" lang="zh-CN" altLang="en-US" sz="1400" dirty="0">
+              <a:latin typeface="Heiti SC Light" charset="-122"/>
+              <a:ea typeface="Heiti SC Light" charset="-122"/>
+              <a:cs typeface="Heiti SC Light" charset="-122"/>
+            </a:endParaRPr>
+          </a:p>
+        </p:txBody>
+      </p:sp>
+      <p:sp>
+        <p:nvSpPr>
+          <p:cNvPr id="101" name="矩形 100"/>
+          <p:cNvSpPr/>
+          <p:nvPr/>
+        </p:nvSpPr>
+        <p:spPr>
+          <a:xfrm>
+            <a:off x="6400801" y="576163"/>
+            <a:ext cx="5181600" cy="5176329"/>
+          </a:xfrm>
+          <a:prstGeom prst="rect">
+            <a:avLst/>
+          </a:prstGeom>
+          <a:ln>
+            <a:noFill/>
+          </a:ln>
+        </p:spPr>
+        <p:style>
+          <a:lnRef idx="1">
+            <a:schemeClr val="accent6"/>
+          </a:lnRef>
+          <a:fillRef idx="2">
+            <a:schemeClr val="accent6"/>
+          </a:fillRef>
+          <a:effectRef idx="1">
+            <a:schemeClr val="accent6"/>
+          </a:effectRef>
+          <a:fontRef idx="minor">
+            <a:schemeClr val="dk1"/>
+          </a:fontRef>
+        </p:style>
+        <p:txBody>
+          <a:bodyPr anchor="b"/>
+          <a:lstStyle/>
+          <a:p>
+            <a:pPr algn="ctr">
+              <a:defRPr/>
+            </a:pPr>
+            <a:r>
+              <a:rPr kumimoji="1" lang="zh-CN" altLang="en-US" sz="1600" b="1" dirty="0" smtClean="0">
+                <a:latin typeface="Heiti SC Light" charset="-122"/>
+                <a:ea typeface="Heiti SC Light" charset="-122"/>
+                <a:cs typeface="Heiti SC Light" charset="-122"/>
+              </a:rPr>
+              <a:t>执行器</a:t>
+            </a:r>
+            <a:endParaRPr kumimoji="1" lang="zh-CN" altLang="en-US" sz="1600" b="1" dirty="0">
+              <a:latin typeface="Heiti SC Light" charset="-122"/>
+              <a:ea typeface="Heiti SC Light" charset="-122"/>
+              <a:cs typeface="Heiti SC Light" charset="-122"/>
+            </a:endParaRPr>
+          </a:p>
+        </p:txBody>
+      </p:sp>
+      <p:sp>
+        <p:nvSpPr>
+          <p:cNvPr id="139" name="圆角矩形 138"/>
+          <p:cNvSpPr/>
+          <p:nvPr/>
+        </p:nvSpPr>
+        <p:spPr>
+          <a:xfrm>
+            <a:off x="4276756" y="3340779"/>
+            <a:ext cx="1659413" cy="574484"/>
+          </a:xfrm>
+          <a:prstGeom prst="roundRect">
+            <a:avLst/>
+          </a:prstGeom>
+          <a:solidFill>
+            <a:srgbClr val="58B8D1"/>
+          </a:solidFill>
+        </p:spPr>
+        <p:style>
+          <a:lnRef idx="0">
+            <a:schemeClr val="accent1"/>
+          </a:lnRef>
+          <a:fillRef idx="3">
+            <a:schemeClr val="accent1"/>
+          </a:fillRef>
+          <a:effectRef idx="3">
+            <a:schemeClr val="accent1"/>
+          </a:effectRef>
+          <a:fontRef idx="minor">
+            <a:schemeClr val="lt1"/>
+          </a:fontRef>
+        </p:style>
+        <p:txBody>
+          <a:bodyPr anchor="ctr"/>
+          <a:lstStyle/>
+          <a:p>
+            <a:pPr algn="ctr">
+              <a:defRPr/>
+            </a:pPr>
+            <a:r>
+              <a:rPr kumimoji="1" lang="zh-CN" altLang="en-US" sz="1400" dirty="0">
+                <a:latin typeface="Heiti SC Light" charset="-122"/>
+                <a:ea typeface="Heiti SC Light" charset="-122"/>
+                <a:cs typeface="Heiti SC Light" charset="-122"/>
+              </a:rPr>
+              <a:t>回调</a:t>
+            </a:r>
+            <a:r>
+              <a:rPr kumimoji="1" lang="zh-CN" altLang="en-US" sz="1400" dirty="0" smtClean="0">
+                <a:latin typeface="Heiti SC Light" charset="-122"/>
+                <a:ea typeface="Heiti SC Light" charset="-122"/>
+                <a:cs typeface="Heiti SC Light" charset="-122"/>
+              </a:rPr>
+              <a:t>服务</a:t>
+            </a:r>
+          </a:p>
+        </p:txBody>
+      </p:sp>
+      <p:sp>
+        <p:nvSpPr>
+          <p:cNvPr id="153" name="矩形 152"/>
+          <p:cNvSpPr/>
+          <p:nvPr/>
+        </p:nvSpPr>
+        <p:spPr>
+          <a:xfrm>
+            <a:off x="720867" y="2657780"/>
+            <a:ext cx="1668047" cy="1961502"/>
+          </a:xfrm>
+          <a:prstGeom prst="rect">
+            <a:avLst/>
+          </a:prstGeom>
+          <a:solidFill>
+            <a:srgbClr val="DEF7FF"/>
+          </a:solidFill>
+          <a:ln>
+            <a:noFill/>
+          </a:ln>
+        </p:spPr>
+        <p:style>
+          <a:lnRef idx="1">
+            <a:schemeClr val="accent1"/>
+          </a:lnRef>
+          <a:fillRef idx="2">
+            <a:schemeClr val="accent1"/>
+          </a:fillRef>
+          <a:effectRef idx="1">
+            <a:schemeClr val="accent1"/>
+          </a:effectRef>
+          <a:fontRef idx="minor">
+            <a:schemeClr val="dk1"/>
+          </a:fontRef>
+        </p:style>
+        <p:txBody>
+          <a:bodyPr anchor="t"/>
+          <a:lstStyle/>
+          <a:p>
+            <a:pPr algn="ctr">
+              <a:defRPr/>
+            </a:pPr>
+            <a:r>
+              <a:rPr kumimoji="1" lang="zh-CN" altLang="en-US" sz="1400" b="1" dirty="0">
+                <a:latin typeface="Heiti SC Light" charset="-122"/>
+                <a:ea typeface="Heiti SC Light" charset="-122"/>
+                <a:cs typeface="Heiti SC Light" charset="-122"/>
+              </a:rPr>
+              <a:t>日志管理</a:t>
+            </a:r>
+          </a:p>
+        </p:txBody>
+      </p:sp>
+      <p:sp>
+        <p:nvSpPr>
+          <p:cNvPr id="154" name="可选流程 153"/>
+          <p:cNvSpPr/>
+          <p:nvPr/>
+        </p:nvSpPr>
+        <p:spPr>
+          <a:xfrm>
+            <a:off x="823933" y="2979152"/>
+            <a:ext cx="1432847" cy="272004"/>
+          </a:xfrm>
+          <a:prstGeom prst="flowChartAlternateProcess">
+            <a:avLst/>
+          </a:prstGeom>
+          <a:solidFill>
+            <a:srgbClr val="4BACC6"/>
+          </a:solidFill>
+        </p:spPr>
+        <p:style>
+          <a:lnRef idx="0">
+            <a:schemeClr val="accent1"/>
+          </a:lnRef>
+          <a:fillRef idx="3">
+            <a:schemeClr val="accent1"/>
+          </a:fillRef>
+          <a:effectRef idx="3">
+            <a:schemeClr val="accent1"/>
+          </a:effectRef>
+          <a:fontRef idx="minor">
+            <a:schemeClr val="lt1"/>
+          </a:fontRef>
+        </p:style>
+        <p:txBody>
+          <a:bodyPr anchor="ctr"/>
+          <a:lstStyle/>
+          <a:p>
+            <a:pPr>
+              <a:defRPr/>
+            </a:pPr>
+            <a:r>
+              <a:rPr kumimoji="1" lang="zh-CN" altLang="en-US" sz="1400" dirty="0">
+                <a:latin typeface="Heiti SC Light" charset="-122"/>
+                <a:ea typeface="Heiti SC Light" charset="-122"/>
+                <a:cs typeface="Heiti SC Light" charset="-122"/>
+              </a:rPr>
+              <a:t>调度日志</a:t>
+            </a:r>
+          </a:p>
+        </p:txBody>
+      </p:sp>
+      <p:sp>
+        <p:nvSpPr>
+          <p:cNvPr id="155" name="可选流程 154"/>
+          <p:cNvSpPr/>
+          <p:nvPr/>
+        </p:nvSpPr>
+        <p:spPr>
+          <a:xfrm>
+            <a:off x="823932" y="3369943"/>
+            <a:ext cx="1432847" cy="275832"/>
+          </a:xfrm>
+          <a:prstGeom prst="flowChartAlternateProcess">
+            <a:avLst/>
+          </a:prstGeom>
+          <a:solidFill>
+            <a:srgbClr val="4BACC6"/>
+          </a:solidFill>
+        </p:spPr>
+        <p:style>
+          <a:lnRef idx="0">
+            <a:schemeClr val="accent1"/>
+          </a:lnRef>
+          <a:fillRef idx="3">
+            <a:schemeClr val="accent1"/>
+          </a:fillRef>
+          <a:effectRef idx="3">
+            <a:schemeClr val="accent1"/>
+          </a:effectRef>
+          <a:fontRef idx="minor">
+            <a:schemeClr val="lt1"/>
+          </a:fontRef>
+        </p:style>
+        <p:txBody>
+          <a:bodyPr anchor="ctr"/>
+          <a:lstStyle/>
+          <a:p>
+            <a:pPr>
+              <a:defRPr/>
+            </a:pPr>
+            <a:r>
+              <a:rPr kumimoji="1" lang="en-US" altLang="zh-CN" sz="1400" dirty="0">
+                <a:latin typeface="Heiti SC Light" charset="-122"/>
+                <a:ea typeface="Heiti SC Light" charset="-122"/>
+                <a:cs typeface="Heiti SC Light" charset="-122"/>
+              </a:rPr>
+              <a:t>Rolling</a:t>
+            </a:r>
+            <a:r>
+              <a:rPr kumimoji="1" lang="zh-CN" altLang="en-US" sz="1400" dirty="0">
+                <a:latin typeface="Heiti SC Light" charset="-122"/>
+                <a:ea typeface="Heiti SC Light" charset="-122"/>
+                <a:cs typeface="Heiti SC Light" charset="-122"/>
+              </a:rPr>
+              <a:t>日志</a:t>
+            </a:r>
+          </a:p>
+        </p:txBody>
+      </p:sp>
+      <p:sp>
+        <p:nvSpPr>
+          <p:cNvPr id="156" name="可选流程 155"/>
+          <p:cNvSpPr/>
+          <p:nvPr/>
+        </p:nvSpPr>
+        <p:spPr>
+          <a:xfrm>
+            <a:off x="823931" y="3804303"/>
+            <a:ext cx="1432847" cy="263850"/>
+          </a:xfrm>
+          <a:prstGeom prst="flowChartAlternateProcess">
+            <a:avLst/>
+          </a:prstGeom>
+          <a:solidFill>
+            <a:srgbClr val="4BACC6"/>
+          </a:solidFill>
+        </p:spPr>
+        <p:style>
+          <a:lnRef idx="0">
+            <a:schemeClr val="accent1"/>
+          </a:lnRef>
+          <a:fillRef idx="3">
+            <a:schemeClr val="accent1"/>
+          </a:fillRef>
+          <a:effectRef idx="3">
+            <a:schemeClr val="accent1"/>
+          </a:effectRef>
+          <a:fontRef idx="minor">
+            <a:schemeClr val="lt1"/>
+          </a:fontRef>
+        </p:style>
+        <p:txBody>
+          <a:bodyPr anchor="ctr"/>
+          <a:lstStyle/>
+          <a:p>
+            <a:pPr>
+              <a:defRPr/>
+            </a:pPr>
+            <a:r>
+              <a:rPr kumimoji="1" lang="en-US" altLang="zh-CN" sz="1400" dirty="0">
+                <a:latin typeface="Heiti SC Light" charset="-122"/>
+                <a:ea typeface="Heiti SC Light" charset="-122"/>
+                <a:cs typeface="Heiti SC Light" charset="-122"/>
+              </a:rPr>
+              <a:t>GLUE</a:t>
+            </a:r>
+            <a:r>
+              <a:rPr kumimoji="1" lang="zh-CN" altLang="en-US" sz="1400" dirty="0">
+                <a:latin typeface="Heiti SC Light" charset="-122"/>
+                <a:ea typeface="Heiti SC Light" charset="-122"/>
+                <a:cs typeface="Heiti SC Light" charset="-122"/>
+              </a:rPr>
+              <a:t>版本日志</a:t>
+            </a:r>
+          </a:p>
+        </p:txBody>
+      </p:sp>
+      <p:sp>
+        <p:nvSpPr>
+          <p:cNvPr id="157" name="可选流程 156"/>
+          <p:cNvSpPr/>
+          <p:nvPr/>
+        </p:nvSpPr>
+        <p:spPr>
+          <a:xfrm>
+            <a:off x="823930" y="4186561"/>
+            <a:ext cx="1432847" cy="263850"/>
+          </a:xfrm>
+          <a:prstGeom prst="flowChartAlternateProcess">
+            <a:avLst/>
+          </a:prstGeom>
+          <a:solidFill>
+            <a:srgbClr val="4BACC6"/>
+          </a:solidFill>
+        </p:spPr>
+        <p:style>
+          <a:lnRef idx="0">
+            <a:schemeClr val="accent1"/>
+          </a:lnRef>
+          <a:fillRef idx="3">
+            <a:schemeClr val="accent1"/>
+          </a:fillRef>
+          <a:effectRef idx="3">
+            <a:schemeClr val="accent1"/>
+          </a:effectRef>
+          <a:fontRef idx="minor">
+            <a:schemeClr val="lt1"/>
+          </a:fontRef>
+        </p:style>
+        <p:txBody>
+          <a:bodyPr anchor="ctr"/>
+          <a:lstStyle/>
+          <a:p>
+            <a:pPr>
+              <a:defRPr/>
+            </a:pPr>
+            <a:r>
+              <a:rPr kumimoji="1" lang="en-US" altLang="zh-CN" sz="1400" dirty="0" smtClean="0">
+                <a:latin typeface="Heiti SC Light" charset="-122"/>
+                <a:ea typeface="Heiti SC Light" charset="-122"/>
+                <a:cs typeface="Heiti SC Light" charset="-122"/>
+              </a:rPr>
+              <a:t>……</a:t>
+            </a:r>
+            <a:endParaRPr kumimoji="1" lang="zh-CN" altLang="en-US" sz="1400" dirty="0">
+              <a:latin typeface="Heiti SC Light" charset="-122"/>
+              <a:ea typeface="Heiti SC Light" charset="-122"/>
+              <a:cs typeface="Heiti SC Light" charset="-122"/>
+            </a:endParaRPr>
+          </a:p>
+        </p:txBody>
+      </p:sp>
+      <p:sp>
+        <p:nvSpPr>
+          <p:cNvPr id="158" name="矩形 157"/>
+          <p:cNvSpPr/>
+          <p:nvPr/>
+        </p:nvSpPr>
+        <p:spPr>
+          <a:xfrm>
+            <a:off x="2384122" y="2645252"/>
+            <a:ext cx="1672839" cy="1974030"/>
+          </a:xfrm>
+          <a:prstGeom prst="rect">
+            <a:avLst/>
+          </a:prstGeom>
+          <a:solidFill>
+            <a:srgbClr val="E0EBFF"/>
+          </a:solidFill>
+          <a:ln>
+            <a:noFill/>
+          </a:ln>
+        </p:spPr>
+        <p:style>
+          <a:lnRef idx="1">
+            <a:schemeClr val="accent1"/>
+          </a:lnRef>
+          <a:fillRef idx="2">
+            <a:schemeClr val="accent1"/>
+          </a:fillRef>
+          <a:effectRef idx="1">
+            <a:schemeClr val="accent1"/>
+          </a:effectRef>
+          <a:fontRef idx="minor">
+            <a:schemeClr val="dk1"/>
+          </a:fontRef>
+        </p:style>
+        <p:txBody>
+          <a:bodyPr anchor="t"/>
+          <a:lstStyle/>
+          <a:p>
+            <a:pPr algn="ctr">
+              <a:defRPr/>
+            </a:pPr>
+            <a:r>
+              <a:rPr kumimoji="1" lang="zh-CN" altLang="en-US" sz="1400" b="1" dirty="0" smtClean="0">
+                <a:latin typeface="Heiti SC Light" charset="-122"/>
+                <a:ea typeface="Heiti SC Light" charset="-122"/>
+                <a:cs typeface="Heiti SC Light" charset="-122"/>
+              </a:rPr>
+              <a:t>其他</a:t>
+            </a:r>
+          </a:p>
+        </p:txBody>
+      </p:sp>
+      <p:sp>
+        <p:nvSpPr>
+          <p:cNvPr id="159" name="可选流程 158"/>
+          <p:cNvSpPr/>
+          <p:nvPr/>
+        </p:nvSpPr>
+        <p:spPr>
+          <a:xfrm>
+            <a:off x="2463148" y="2972582"/>
+            <a:ext cx="1535914" cy="251629"/>
+          </a:xfrm>
+          <a:prstGeom prst="flowChartAlternateProcess">
+            <a:avLst/>
+          </a:prstGeom>
+          <a:solidFill>
+            <a:srgbClr val="6095C9"/>
+          </a:solidFill>
+        </p:spPr>
+        <p:style>
+          <a:lnRef idx="0">
+            <a:schemeClr val="accent1"/>
+          </a:lnRef>
+          <a:fillRef idx="3">
+            <a:schemeClr val="accent1"/>
+          </a:fillRef>
+          <a:effectRef idx="3">
+            <a:schemeClr val="accent1"/>
+          </a:effectRef>
+          <a:fontRef idx="minor">
+            <a:schemeClr val="lt1"/>
+          </a:fontRef>
+        </p:style>
+        <p:txBody>
+          <a:bodyPr anchor="ctr"/>
+          <a:lstStyle/>
+          <a:p>
+            <a:pPr>
+              <a:defRPr/>
+            </a:pPr>
+            <a:r>
+              <a:rPr kumimoji="1" lang="zh-CN" altLang="en-US" sz="1400" dirty="0" smtClean="0">
+                <a:latin typeface="Heiti SC Light" charset="-122"/>
+                <a:ea typeface="Heiti SC Light" charset="-122"/>
+                <a:cs typeface="Heiti SC Light" charset="-122"/>
+              </a:rPr>
+              <a:t>运行报表</a:t>
+            </a:r>
+            <a:endParaRPr kumimoji="1" lang="zh-CN" altLang="en-US" sz="1400" dirty="0">
+              <a:latin typeface="Heiti SC Light" charset="-122"/>
+              <a:ea typeface="Heiti SC Light" charset="-122"/>
+              <a:cs typeface="Heiti SC Light" charset="-122"/>
+            </a:endParaRPr>
+          </a:p>
+        </p:txBody>
+      </p:sp>
+      <p:sp>
+        <p:nvSpPr>
+          <p:cNvPr id="160" name="可选流程 159"/>
+          <p:cNvSpPr/>
+          <p:nvPr/>
+        </p:nvSpPr>
+        <p:spPr>
+          <a:xfrm>
+            <a:off x="2463148" y="3363264"/>
+            <a:ext cx="1535914" cy="281598"/>
+          </a:xfrm>
+          <a:prstGeom prst="flowChartAlternateProcess">
+            <a:avLst/>
+          </a:prstGeom>
+          <a:solidFill>
+            <a:srgbClr val="6095C9"/>
+          </a:solidFill>
+        </p:spPr>
+        <p:style>
+          <a:lnRef idx="0">
+            <a:schemeClr val="accent1"/>
+          </a:lnRef>
+          <a:fillRef idx="3">
+            <a:schemeClr val="accent1"/>
+          </a:fillRef>
+          <a:effectRef idx="3">
+            <a:schemeClr val="accent1"/>
+          </a:effectRef>
+          <a:fontRef idx="minor">
+            <a:schemeClr val="lt1"/>
+          </a:fontRef>
+        </p:style>
+        <p:txBody>
+          <a:bodyPr anchor="ctr"/>
+          <a:lstStyle/>
+          <a:p>
+            <a:pPr>
+              <a:defRPr/>
+            </a:pPr>
+            <a:r>
+              <a:rPr kumimoji="1" lang="zh-CN" altLang="en-US" sz="1400" dirty="0" smtClean="0">
+                <a:latin typeface="Heiti SC Light" charset="-122"/>
+                <a:ea typeface="Heiti SC Light" charset="-122"/>
+                <a:cs typeface="Heiti SC Light" charset="-122"/>
+              </a:rPr>
+              <a:t>失败告警</a:t>
+            </a:r>
+            <a:endParaRPr kumimoji="1" lang="zh-CN" altLang="en-US" sz="1400" dirty="0">
+              <a:latin typeface="Heiti SC Light" charset="-122"/>
+              <a:ea typeface="Heiti SC Light" charset="-122"/>
+              <a:cs typeface="Heiti SC Light" charset="-122"/>
+            </a:endParaRPr>
+          </a:p>
+        </p:txBody>
+      </p:sp>
+      <p:sp>
+        <p:nvSpPr>
+          <p:cNvPr id="161" name="可选流程 160"/>
+          <p:cNvSpPr/>
+          <p:nvPr/>
+        </p:nvSpPr>
+        <p:spPr>
+          <a:xfrm>
+            <a:off x="2463148" y="3787601"/>
+            <a:ext cx="1535914" cy="255324"/>
+          </a:xfrm>
+          <a:prstGeom prst="flowChartAlternateProcess">
+            <a:avLst/>
+          </a:prstGeom>
+          <a:solidFill>
+            <a:srgbClr val="6095C9"/>
+          </a:solidFill>
+        </p:spPr>
+        <p:style>
+          <a:lnRef idx="0">
+            <a:schemeClr val="accent1"/>
+          </a:lnRef>
+          <a:fillRef idx="3">
+            <a:schemeClr val="accent1"/>
+          </a:fillRef>
+          <a:effectRef idx="3">
+            <a:schemeClr val="accent1"/>
+          </a:effectRef>
+          <a:fontRef idx="minor">
+            <a:schemeClr val="lt1"/>
+          </a:fontRef>
+        </p:style>
+        <p:txBody>
+          <a:bodyPr anchor="ctr"/>
+          <a:lstStyle/>
+          <a:p>
+            <a:pPr>
+              <a:defRPr/>
+            </a:pPr>
+            <a:r>
+              <a:rPr kumimoji="1" lang="zh-CN" altLang="en-US" sz="1400" dirty="0" smtClean="0">
+                <a:latin typeface="Heiti SC Light" charset="-122"/>
+                <a:ea typeface="Heiti SC Light" charset="-122"/>
+                <a:cs typeface="Heiti SC Light" charset="-122"/>
+              </a:rPr>
+              <a:t>任务依赖</a:t>
+            </a:r>
+            <a:endParaRPr kumimoji="1" lang="zh-CN" altLang="en-US" sz="1400" dirty="0">
+              <a:latin typeface="Heiti SC Light" charset="-122"/>
+              <a:ea typeface="Heiti SC Light" charset="-122"/>
+              <a:cs typeface="Heiti SC Light" charset="-122"/>
+            </a:endParaRPr>
+          </a:p>
+        </p:txBody>
+      </p:sp>
+      <p:sp>
+        <p:nvSpPr>
+          <p:cNvPr id="162" name="可选流程 161"/>
+          <p:cNvSpPr/>
+          <p:nvPr/>
+        </p:nvSpPr>
+        <p:spPr>
+          <a:xfrm>
+            <a:off x="2463148" y="4163682"/>
+            <a:ext cx="1535914" cy="274201"/>
+          </a:xfrm>
+          <a:prstGeom prst="flowChartAlternateProcess">
+            <a:avLst/>
+          </a:prstGeom>
+          <a:solidFill>
+            <a:srgbClr val="6095C9"/>
+          </a:solidFill>
+        </p:spPr>
+        <p:style>
+          <a:lnRef idx="0">
+            <a:schemeClr val="accent1"/>
+          </a:lnRef>
+          <a:fillRef idx="3">
+            <a:schemeClr val="accent1"/>
+          </a:fillRef>
+          <a:effectRef idx="3">
+            <a:schemeClr val="accent1"/>
+          </a:effectRef>
+          <a:fontRef idx="minor">
+            <a:schemeClr val="lt1"/>
+          </a:fontRef>
+        </p:style>
+        <p:txBody>
+          <a:bodyPr anchor="ctr"/>
+          <a:lstStyle/>
+          <a:p>
+            <a:pPr>
+              <a:defRPr/>
+            </a:pPr>
+            <a:r>
+              <a:rPr kumimoji="1" lang="en-US" altLang="zh-CN" sz="1400" dirty="0" smtClean="0">
+                <a:latin typeface="Heiti SC Light" charset="-122"/>
+                <a:ea typeface="Heiti SC Light" charset="-122"/>
+                <a:cs typeface="Heiti SC Light" charset="-122"/>
+              </a:rPr>
+              <a:t>……</a:t>
+            </a:r>
+            <a:endParaRPr kumimoji="1" lang="zh-CN" altLang="en-US" sz="1400" dirty="0">
+              <a:latin typeface="Heiti SC Light" charset="-122"/>
+              <a:ea typeface="Heiti SC Light" charset="-122"/>
+              <a:cs typeface="Heiti SC Light" charset="-122"/>
+            </a:endParaRPr>
+          </a:p>
+        </p:txBody>
+      </p:sp>
+      <p:sp>
+        <p:nvSpPr>
+          <p:cNvPr id="30" name="可选流程 29"/>
+          <p:cNvSpPr/>
+          <p:nvPr/>
+        </p:nvSpPr>
+        <p:spPr>
+          <a:xfrm>
+            <a:off x="6903492" y="4598011"/>
+            <a:ext cx="1948408" cy="566196"/>
+          </a:xfrm>
+          <a:prstGeom prst="flowChartAlternateProcess">
+            <a:avLst/>
+          </a:prstGeom>
+          <a:solidFill>
+            <a:srgbClr val="9379B3"/>
+          </a:solidFill>
+        </p:spPr>
+        <p:style>
+          <a:lnRef idx="0">
+            <a:schemeClr val="accent1"/>
+          </a:lnRef>
+          <a:fillRef idx="3">
+            <a:schemeClr val="accent1"/>
+          </a:fillRef>
+          <a:effectRef idx="3">
+            <a:schemeClr val="accent1"/>
+          </a:effectRef>
+          <a:fontRef idx="minor">
+            <a:schemeClr val="lt1"/>
+          </a:fontRef>
+        </p:style>
+        <p:txBody>
+          <a:bodyPr anchor="ctr"/>
+          <a:lstStyle/>
+          <a:p>
+            <a:pPr algn="ctr">
+              <a:defRPr/>
+            </a:pPr>
+            <a:r>
+              <a:rPr kumimoji="1" lang="zh-CN" altLang="en-US" sz="1400" dirty="0" smtClean="0">
+                <a:latin typeface="Heiti SC Light" charset="-122"/>
+                <a:ea typeface="Heiti SC Light" charset="-122"/>
+                <a:cs typeface="Heiti SC Light" charset="-122"/>
+              </a:rPr>
+              <a:t>注册线程</a:t>
+            </a:r>
+            <a:endParaRPr kumimoji="1" lang="zh-CN" altLang="en-US" sz="1400" dirty="0">
+              <a:latin typeface="Heiti SC Light" charset="-122"/>
+              <a:ea typeface="Heiti SC Light" charset="-122"/>
+              <a:cs typeface="Heiti SC Light" charset="-122"/>
+            </a:endParaRPr>
+          </a:p>
+        </p:txBody>
+      </p:sp>
+      <p:sp>
+        <p:nvSpPr>
+          <p:cNvPr id="97" name="可选流程 96"/>
+          <p:cNvSpPr/>
+          <p:nvPr/>
+        </p:nvSpPr>
+        <p:spPr>
+          <a:xfrm>
+            <a:off x="6862476" y="992498"/>
+            <a:ext cx="2469578" cy="586589"/>
+          </a:xfrm>
+          <a:prstGeom prst="flowChartAlternateProcess">
+            <a:avLst/>
+          </a:prstGeom>
+        </p:spPr>
+        <p:style>
+          <a:lnRef idx="0">
+            <a:schemeClr val="accent2"/>
+          </a:lnRef>
+          <a:fillRef idx="3">
+            <a:schemeClr val="accent2"/>
+          </a:fillRef>
+          <a:effectRef idx="3">
+            <a:schemeClr val="accent2"/>
+          </a:effectRef>
+          <a:fontRef idx="minor">
+            <a:schemeClr val="lt1"/>
+          </a:fontRef>
+        </p:style>
+        <p:txBody>
+          <a:bodyPr rtlCol="0" anchor="ctr"/>
+          <a:lstStyle/>
+          <a:p>
+            <a:pPr algn="ctr"/>
+            <a:r>
+              <a:rPr kumimoji="1" lang="zh-CN" altLang="en-US" sz="1400" dirty="0" smtClean="0">
+                <a:latin typeface="Heiti SC Light" charset="-122"/>
+                <a:ea typeface="Heiti SC Light" charset="-122"/>
+                <a:cs typeface="Heiti SC Light" charset="-122"/>
+              </a:rPr>
+              <a:t>执行器服务</a:t>
+            </a:r>
+            <a:endParaRPr kumimoji="1" lang="zh-CN" altLang="en-US" sz="1400" dirty="0">
+              <a:latin typeface="Heiti SC Light" charset="-122"/>
+              <a:ea typeface="Heiti SC Light" charset="-122"/>
+              <a:cs typeface="Heiti SC Light" charset="-122"/>
+            </a:endParaRPr>
+          </a:p>
+        </p:txBody>
+      </p:sp>
+      <p:sp>
+        <p:nvSpPr>
+          <p:cNvPr id="169" name="矩形 168"/>
+          <p:cNvSpPr/>
+          <p:nvPr/>
+        </p:nvSpPr>
+        <p:spPr>
+          <a:xfrm>
+            <a:off x="9740643" y="890130"/>
+            <a:ext cx="1588645" cy="3248072"/>
+          </a:xfrm>
+          <a:prstGeom prst="rect">
+            <a:avLst/>
+          </a:prstGeom>
+          <a:solidFill>
+            <a:srgbClr val="DEF7FF"/>
+          </a:solidFill>
+          <a:ln>
+            <a:noFill/>
+          </a:ln>
+        </p:spPr>
+        <p:style>
+          <a:lnRef idx="1">
+            <a:schemeClr val="accent1"/>
+          </a:lnRef>
+          <a:fillRef idx="2">
+            <a:schemeClr val="accent1"/>
+          </a:fillRef>
+          <a:effectRef idx="1">
+            <a:schemeClr val="accent1"/>
+          </a:effectRef>
+          <a:fontRef idx="minor">
+            <a:schemeClr val="dk1"/>
+          </a:fontRef>
+        </p:style>
+        <p:txBody>
+          <a:bodyPr anchor="b"/>
+          <a:lstStyle/>
+          <a:p>
+            <a:pPr algn="ctr">
+              <a:defRPr/>
+            </a:pPr>
+            <a:endParaRPr kumimoji="1" lang="zh-CN" altLang="en-US" sz="1600" b="1" dirty="0">
+              <a:latin typeface="Heiti SC Light" charset="-122"/>
+              <a:ea typeface="Heiti SC Light" charset="-122"/>
+              <a:cs typeface="Heiti SC Light" charset="-122"/>
+            </a:endParaRPr>
+          </a:p>
+        </p:txBody>
+      </p:sp>
+      <p:cxnSp>
+        <p:nvCxnSpPr>
+          <p:cNvPr id="171" name="直线箭头连接符 170"/>
+          <p:cNvCxnSpPr/>
+          <p:nvPr/>
+        </p:nvCxnSpPr>
+        <p:spPr>
+          <a:xfrm>
+            <a:off x="9367694" y="1301309"/>
+            <a:ext cx="355704" cy="3349"/>
+          </a:xfrm>
+          <a:prstGeom prst="straightConnector1">
+            <a:avLst/>
+          </a:prstGeom>
+          <a:ln w="28575">
+            <a:prstDash val="sysDash"/>
+            <a:headEnd type="none" w="med" len="med"/>
+            <a:tailEnd type="arrow" w="med" len="med"/>
+          </a:ln>
+        </p:spPr>
+        <p:style>
+          <a:lnRef idx="2">
+            <a:schemeClr val="accent1"/>
+          </a:lnRef>
+          <a:fillRef idx="0">
+            <a:schemeClr val="accent1"/>
+          </a:fillRef>
+          <a:effectRef idx="1">
+            <a:schemeClr val="accent1"/>
+          </a:effectRef>
+          <a:fontRef idx="minor">
+            <a:schemeClr val="tx1"/>
+          </a:fontRef>
+        </p:style>
+      </p:cxnSp>
+      <p:sp>
+        <p:nvSpPr>
+          <p:cNvPr id="177" name="矩形 176"/>
+          <p:cNvSpPr/>
+          <p:nvPr/>
+        </p:nvSpPr>
+        <p:spPr>
+          <a:xfrm>
+            <a:off x="6874533" y="3224448"/>
+            <a:ext cx="2445465" cy="856602"/>
+          </a:xfrm>
+          <a:prstGeom prst="rect">
+            <a:avLst/>
+          </a:prstGeom>
+          <a:solidFill>
+            <a:srgbClr val="DEF7FF"/>
+          </a:solidFill>
+          <a:ln>
+            <a:solidFill>
+              <a:srgbClr val="FFF2CD"/>
+            </a:solidFill>
+          </a:ln>
+        </p:spPr>
+        <p:style>
+          <a:lnRef idx="1">
+            <a:schemeClr val="accent1"/>
+          </a:lnRef>
+          <a:fillRef idx="2">
+            <a:schemeClr val="accent1"/>
+          </a:fillRef>
+          <a:effectRef idx="1">
+            <a:schemeClr val="accent1"/>
+          </a:effectRef>
+          <a:fontRef idx="minor">
+            <a:schemeClr val="dk1"/>
+          </a:fontRef>
+        </p:style>
+        <p:txBody>
+          <a:bodyPr anchor="b"/>
+          <a:lstStyle/>
+          <a:p>
+            <a:pPr algn="ctr">
+              <a:defRPr/>
+            </a:pPr>
+            <a:endParaRPr kumimoji="1" lang="zh-CN" altLang="en-US" sz="1600" b="1" dirty="0">
+              <a:latin typeface="Heiti SC Light" charset="-122"/>
+              <a:ea typeface="Heiti SC Light" charset="-122"/>
+              <a:cs typeface="Heiti SC Light" charset="-122"/>
+            </a:endParaRPr>
+          </a:p>
+        </p:txBody>
+      </p:sp>
+      <p:sp>
+        <p:nvSpPr>
+          <p:cNvPr id="178" name="磁盘 177"/>
+          <p:cNvSpPr/>
+          <p:nvPr/>
+        </p:nvSpPr>
+        <p:spPr>
+          <a:xfrm>
+            <a:off x="8115679" y="3330715"/>
+            <a:ext cx="1128362" cy="644066"/>
+          </a:xfrm>
+          <a:prstGeom prst="flowChartMagneticDisk">
+            <a:avLst/>
+          </a:prstGeom>
+        </p:spPr>
+        <p:style>
+          <a:lnRef idx="1">
+            <a:schemeClr val="accent4"/>
+          </a:lnRef>
+          <a:fillRef idx="2">
+            <a:schemeClr val="accent4"/>
+          </a:fillRef>
+          <a:effectRef idx="1">
+            <a:schemeClr val="accent4"/>
+          </a:effectRef>
+          <a:fontRef idx="minor">
+            <a:schemeClr val="dk1"/>
+          </a:fontRef>
+        </p:style>
+        <p:txBody>
+          <a:bodyPr rtlCol="0" anchor="ctr"/>
+          <a:lstStyle/>
+          <a:p>
+            <a:pPr algn="ctr"/>
+            <a:r>
+              <a:rPr kumimoji="1" lang="zh-CN" altLang="en-US" sz="1400" dirty="0" smtClean="0">
+                <a:latin typeface="Heiti SC Light" charset="-122"/>
+                <a:ea typeface="Heiti SC Light" charset="-122"/>
+                <a:cs typeface="Heiti SC Light" charset="-122"/>
+              </a:rPr>
+              <a:t>调度结果</a:t>
+            </a:r>
+          </a:p>
+          <a:p>
+            <a:pPr algn="ctr"/>
+            <a:r>
+              <a:rPr kumimoji="1" lang="en-US" altLang="zh-CN" sz="1400" dirty="0" smtClean="0">
+                <a:latin typeface="Heiti SC Light" charset="-122"/>
+                <a:ea typeface="Heiti SC Light" charset="-122"/>
+                <a:cs typeface="Heiti SC Light" charset="-122"/>
+              </a:rPr>
+              <a:t>(queue)</a:t>
+            </a:r>
+            <a:endParaRPr kumimoji="1" lang="zh-CN" altLang="en-US" sz="1400" dirty="0">
+              <a:latin typeface="Heiti SC Light" charset="-122"/>
+              <a:ea typeface="Heiti SC Light" charset="-122"/>
+              <a:cs typeface="Heiti SC Light" charset="-122"/>
+            </a:endParaRPr>
+          </a:p>
+        </p:txBody>
+      </p:sp>
+      <p:cxnSp>
+        <p:nvCxnSpPr>
+          <p:cNvPr id="185" name="直线箭头连接符 184"/>
+          <p:cNvCxnSpPr/>
+          <p:nvPr/>
+        </p:nvCxnSpPr>
+        <p:spPr>
+          <a:xfrm flipH="1">
+            <a:off x="5940012" y="2356487"/>
+            <a:ext cx="893129" cy="645"/>
+          </a:xfrm>
+          <a:prstGeom prst="straightConnector1">
+            <a:avLst/>
+          </a:prstGeom>
+          <a:ln w="28575">
+            <a:prstDash val="sysDash"/>
+            <a:headEnd type="none" w="med" len="med"/>
+            <a:tailEnd type="arrow" w="med" len="med"/>
+          </a:ln>
+        </p:spPr>
+        <p:style>
+          <a:lnRef idx="2">
+            <a:schemeClr val="accent1"/>
+          </a:lnRef>
+          <a:fillRef idx="0">
+            <a:schemeClr val="accent1"/>
+          </a:fillRef>
+          <a:effectRef idx="1">
+            <a:schemeClr val="accent1"/>
+          </a:effectRef>
+          <a:fontRef idx="minor">
+            <a:schemeClr val="tx1"/>
+          </a:fontRef>
+        </p:style>
+      </p:cxnSp>
+      <p:sp>
+        <p:nvSpPr>
+          <p:cNvPr id="194" name="可选流程 193"/>
+          <p:cNvSpPr/>
+          <p:nvPr/>
+        </p:nvSpPr>
+        <p:spPr>
+          <a:xfrm>
+            <a:off x="9907238" y="2193143"/>
+            <a:ext cx="1295671" cy="611595"/>
+          </a:xfrm>
+          <a:prstGeom prst="flowChartAlternateProcess">
+            <a:avLst/>
+          </a:prstGeom>
+          <a:solidFill>
+            <a:srgbClr val="4BACC6"/>
+          </a:solidFill>
+        </p:spPr>
+        <p:style>
+          <a:lnRef idx="0">
+            <a:schemeClr val="accent1"/>
+          </a:lnRef>
+          <a:fillRef idx="3">
+            <a:schemeClr val="accent1"/>
+          </a:fillRef>
+          <a:effectRef idx="3">
+            <a:schemeClr val="accent1"/>
+          </a:effectRef>
+          <a:fontRef idx="minor">
+            <a:schemeClr val="lt1"/>
+          </a:fontRef>
+        </p:style>
+        <p:txBody>
+          <a:bodyPr anchor="ctr"/>
+          <a:lstStyle/>
+          <a:p>
+            <a:pPr algn="ctr"/>
+            <a:r>
+              <a:rPr kumimoji="1" lang="en-US" altLang="zh-CN" sz="1400" dirty="0">
+                <a:latin typeface="Heiti SC Light" charset="-122"/>
+                <a:ea typeface="Heiti SC Light" charset="-122"/>
+                <a:cs typeface="Heiti SC Light" charset="-122"/>
+              </a:rPr>
+              <a:t>JobHandler</a:t>
+            </a:r>
+            <a:endParaRPr kumimoji="1" lang="zh-CN" altLang="en-US" sz="1400" dirty="0">
+              <a:latin typeface="Heiti SC Light" charset="-122"/>
+              <a:ea typeface="Heiti SC Light" charset="-122"/>
+              <a:cs typeface="Heiti SC Light" charset="-122"/>
+            </a:endParaRPr>
+          </a:p>
+        </p:txBody>
+      </p:sp>
+      <p:sp>
+        <p:nvSpPr>
+          <p:cNvPr id="195" name="可选流程 194"/>
+          <p:cNvSpPr/>
+          <p:nvPr/>
+        </p:nvSpPr>
+        <p:spPr>
+          <a:xfrm>
+            <a:off x="9907238" y="3253003"/>
+            <a:ext cx="1295671" cy="606434"/>
+          </a:xfrm>
+          <a:prstGeom prst="flowChartAlternateProcess">
+            <a:avLst/>
+          </a:prstGeom>
+          <a:solidFill>
+            <a:srgbClr val="4BACC6"/>
+          </a:solidFill>
+        </p:spPr>
+        <p:style>
+          <a:lnRef idx="0">
+            <a:schemeClr val="accent1"/>
+          </a:lnRef>
+          <a:fillRef idx="3">
+            <a:schemeClr val="accent1"/>
+          </a:fillRef>
+          <a:effectRef idx="3">
+            <a:schemeClr val="accent1"/>
+          </a:effectRef>
+          <a:fontRef idx="minor">
+            <a:schemeClr val="lt1"/>
+          </a:fontRef>
+        </p:style>
+        <p:txBody>
+          <a:bodyPr anchor="ctr"/>
+          <a:lstStyle/>
+          <a:p>
+            <a:pPr algn="ctr"/>
+            <a:r>
+              <a:rPr kumimoji="1" lang="zh-CN" altLang="en-US" sz="1400" dirty="0">
+                <a:latin typeface="Heiti SC Light" charset="-122"/>
+                <a:ea typeface="Heiti SC Light" charset="-122"/>
+                <a:cs typeface="Heiti SC Light" charset="-122"/>
+              </a:rPr>
+              <a:t>任务线程</a:t>
+            </a:r>
+          </a:p>
+        </p:txBody>
+      </p:sp>
+      <p:sp>
+        <p:nvSpPr>
+          <p:cNvPr id="196" name="磁盘 195"/>
+          <p:cNvSpPr/>
+          <p:nvPr/>
+        </p:nvSpPr>
+        <p:spPr>
+          <a:xfrm>
+            <a:off x="9904842" y="1079536"/>
+            <a:ext cx="1295671" cy="663886"/>
+          </a:xfrm>
+          <a:prstGeom prst="flowChartMagneticDisk">
+            <a:avLst/>
+          </a:prstGeom>
+        </p:spPr>
+        <p:style>
+          <a:lnRef idx="1">
+            <a:schemeClr val="accent4"/>
+          </a:lnRef>
+          <a:fillRef idx="2">
+            <a:schemeClr val="accent4"/>
+          </a:fillRef>
+          <a:effectRef idx="1">
+            <a:schemeClr val="accent4"/>
+          </a:effectRef>
+          <a:fontRef idx="minor">
+            <a:schemeClr val="dk1"/>
+          </a:fontRef>
+        </p:style>
+        <p:txBody>
+          <a:bodyPr anchor="ctr"/>
+          <a:lstStyle/>
+          <a:p>
+            <a:pPr algn="ctr"/>
+            <a:r>
+              <a:rPr kumimoji="1" lang="zh-CN" altLang="en-US" sz="1400" dirty="0">
+                <a:latin typeface="Heiti SC Light" charset="-122"/>
+                <a:ea typeface="Heiti SC Light" charset="-122"/>
+                <a:cs typeface="Heiti SC Light" charset="-122"/>
+              </a:rPr>
+              <a:t>调度请求</a:t>
+            </a:r>
+          </a:p>
+          <a:p>
+            <a:pPr algn="ctr"/>
+            <a:r>
+              <a:rPr kumimoji="1" lang="en-US" altLang="zh-CN" sz="1400" dirty="0">
+                <a:latin typeface="Heiti SC Light" charset="-122"/>
+                <a:ea typeface="Heiti SC Light" charset="-122"/>
+                <a:cs typeface="Heiti SC Light" charset="-122"/>
+              </a:rPr>
+              <a:t>(queue)</a:t>
+            </a:r>
+            <a:endParaRPr kumimoji="1" lang="zh-CN" altLang="en-US" sz="1400" dirty="0">
+              <a:latin typeface="Heiti SC Light" charset="-122"/>
+              <a:ea typeface="Heiti SC Light" charset="-122"/>
+              <a:cs typeface="Heiti SC Light" charset="-122"/>
+            </a:endParaRPr>
+          </a:p>
+        </p:txBody>
+      </p:sp>
+      <p:cxnSp>
+        <p:nvCxnSpPr>
+          <p:cNvPr id="207" name="直线箭头连接符 206"/>
+          <p:cNvCxnSpPr/>
+          <p:nvPr/>
+        </p:nvCxnSpPr>
+        <p:spPr>
+          <a:xfrm flipH="1" flipV="1">
+            <a:off x="5938417" y="3627371"/>
+            <a:ext cx="872707" cy="11641"/>
+          </a:xfrm>
+          <a:prstGeom prst="straightConnector1">
+            <a:avLst/>
+          </a:prstGeom>
+          <a:ln w="28575">
+            <a:prstDash val="sysDash"/>
+            <a:headEnd type="none" w="med" len="med"/>
+            <a:tailEnd type="arrow" w="med" len="med"/>
+          </a:ln>
+        </p:spPr>
+        <p:style>
+          <a:lnRef idx="2">
+            <a:schemeClr val="accent1"/>
+          </a:lnRef>
+          <a:fillRef idx="0">
+            <a:schemeClr val="accent1"/>
+          </a:fillRef>
+          <a:effectRef idx="1">
+            <a:schemeClr val="accent1"/>
+          </a:effectRef>
+          <a:fontRef idx="minor">
+            <a:schemeClr val="tx1"/>
+          </a:fontRef>
+        </p:style>
+      </p:cxnSp>
+      <p:sp>
+        <p:nvSpPr>
+          <p:cNvPr id="57" name="圆角矩形 56"/>
+          <p:cNvSpPr/>
+          <p:nvPr/>
+        </p:nvSpPr>
+        <p:spPr>
+          <a:xfrm>
+            <a:off x="9224192" y="4620762"/>
+            <a:ext cx="1990310" cy="567638"/>
+          </a:xfrm>
+          <a:prstGeom prst="roundRect">
+            <a:avLst/>
+          </a:prstGeom>
+          <a:solidFill>
+            <a:srgbClr val="58B8D1"/>
+          </a:solidFill>
+        </p:spPr>
+        <p:style>
+          <a:lnRef idx="0">
+            <a:schemeClr val="accent1"/>
+          </a:lnRef>
+          <a:fillRef idx="3">
+            <a:schemeClr val="accent1"/>
+          </a:fillRef>
+          <a:effectRef idx="3">
+            <a:schemeClr val="accent1"/>
+          </a:effectRef>
+          <a:fontRef idx="minor">
+            <a:schemeClr val="lt1"/>
+          </a:fontRef>
+        </p:style>
+        <p:txBody>
+          <a:bodyPr anchor="ctr"/>
+          <a:lstStyle/>
+          <a:p>
+            <a:pPr algn="ctr">
+              <a:defRPr/>
+            </a:pPr>
+            <a:r>
+              <a:rPr kumimoji="1" lang="zh-CN" altLang="en-US" sz="1400" dirty="0">
+                <a:latin typeface="Heiti SC Light" charset="-122"/>
+                <a:ea typeface="Heiti SC Light" charset="-122"/>
+                <a:cs typeface="Heiti SC Light" charset="-122"/>
+              </a:rPr>
+              <a:t>自研</a:t>
+            </a:r>
+            <a:r>
+              <a:rPr kumimoji="1" lang="en-US" altLang="zh-CN" sz="1400" dirty="0" smtClean="0">
+                <a:latin typeface="Heiti SC Light" charset="-122"/>
+                <a:ea typeface="Heiti SC Light" charset="-122"/>
+                <a:cs typeface="Heiti SC Light" charset="-122"/>
+              </a:rPr>
+              <a:t>RPC</a:t>
+            </a:r>
+            <a:r>
+              <a:rPr kumimoji="1" lang="zh-CN" altLang="en-US" sz="1400" dirty="0" smtClean="0">
+                <a:latin typeface="Heiti SC Light" charset="-122"/>
+                <a:ea typeface="Heiti SC Light" charset="-122"/>
+                <a:cs typeface="Heiti SC Light" charset="-122"/>
+              </a:rPr>
+              <a:t>（</a:t>
+            </a:r>
+            <a:r>
+              <a:rPr kumimoji="1" lang="en-US" altLang="zh-CN" sz="1400" dirty="0" smtClean="0">
+                <a:latin typeface="Heiti SC Light" charset="-122"/>
+                <a:ea typeface="Heiti SC Light" charset="-122"/>
+                <a:cs typeface="Heiti SC Light" charset="-122"/>
+              </a:rPr>
+              <a:t>xxl-rpc</a:t>
+            </a:r>
+            <a:r>
+              <a:rPr kumimoji="1" lang="zh-CN" altLang="en-US" sz="1400" dirty="0" smtClean="0">
+                <a:latin typeface="Heiti SC Light" charset="-122"/>
+                <a:ea typeface="Heiti SC Light" charset="-122"/>
+                <a:cs typeface="Heiti SC Light" charset="-122"/>
+              </a:rPr>
+              <a:t>）</a:t>
+            </a:r>
+          </a:p>
+        </p:txBody>
+      </p:sp>
+      <p:cxnSp>
+        <p:nvCxnSpPr>
+          <p:cNvPr id="52" name="直线箭头连接符 51"/>
+          <p:cNvCxnSpPr/>
+          <p:nvPr/>
+        </p:nvCxnSpPr>
+        <p:spPr>
+          <a:xfrm flipH="1" flipV="1">
+            <a:off x="5943168" y="4896551"/>
+            <a:ext cx="903294" cy="11119"/>
+          </a:xfrm>
+          <a:prstGeom prst="straightConnector1">
+            <a:avLst/>
+          </a:prstGeom>
+          <a:ln w="28575">
+            <a:prstDash val="sysDash"/>
+            <a:headEnd type="none" w="med" len="med"/>
+            <a:tailEnd type="arrow" w="med" len="med"/>
+          </a:ln>
+        </p:spPr>
+        <p:style>
+          <a:lnRef idx="2">
+            <a:schemeClr val="accent1"/>
+          </a:lnRef>
+          <a:fillRef idx="0">
+            <a:schemeClr val="accent1"/>
+          </a:fillRef>
+          <a:effectRef idx="1">
+            <a:schemeClr val="accent1"/>
+          </a:effectRef>
+          <a:fontRef idx="minor">
+            <a:schemeClr val="tx1"/>
+          </a:fontRef>
+        </p:style>
+      </p:cxnSp>
+      <p:sp>
+        <p:nvSpPr>
+          <p:cNvPr id="81" name="矩形 80"/>
+          <p:cNvSpPr/>
+          <p:nvPr/>
+        </p:nvSpPr>
+        <p:spPr>
+          <a:xfrm>
+            <a:off x="6861591" y="1940899"/>
+            <a:ext cx="2458407" cy="856602"/>
+          </a:xfrm>
+          <a:prstGeom prst="rect">
+            <a:avLst/>
+          </a:prstGeom>
+          <a:solidFill>
+            <a:srgbClr val="E0EBFF"/>
+          </a:solidFill>
+          <a:ln>
+            <a:solidFill>
+              <a:srgbClr val="FFF2CD"/>
+            </a:solidFill>
+          </a:ln>
+        </p:spPr>
+        <p:style>
+          <a:lnRef idx="1">
+            <a:schemeClr val="accent1"/>
+          </a:lnRef>
+          <a:fillRef idx="2">
+            <a:schemeClr val="accent1"/>
+          </a:fillRef>
+          <a:effectRef idx="1">
+            <a:schemeClr val="accent1"/>
+          </a:effectRef>
+          <a:fontRef idx="minor">
+            <a:schemeClr val="dk1"/>
+          </a:fontRef>
+        </p:style>
+        <p:txBody>
+          <a:bodyPr anchor="b"/>
+          <a:lstStyle/>
+          <a:p>
+            <a:pPr algn="ctr">
+              <a:defRPr/>
+            </a:pPr>
+            <a:endParaRPr kumimoji="1" lang="zh-CN" altLang="en-US" sz="1600" b="1" dirty="0">
+              <a:latin typeface="Heiti SC Light" charset="-122"/>
+              <a:ea typeface="Heiti SC Light" charset="-122"/>
+              <a:cs typeface="Heiti SC Light" charset="-122"/>
+            </a:endParaRPr>
+          </a:p>
+        </p:txBody>
+      </p:sp>
+      <p:sp>
+        <p:nvSpPr>
+          <p:cNvPr id="82" name="多文档 81"/>
+          <p:cNvSpPr/>
+          <p:nvPr/>
+        </p:nvSpPr>
+        <p:spPr>
+          <a:xfrm>
+            <a:off x="8102736" y="2034466"/>
+            <a:ext cx="1128362" cy="644066"/>
+          </a:xfrm>
+          <a:prstGeom prst="flowChartMultidocument">
+            <a:avLst/>
+          </a:prstGeom>
+        </p:spPr>
+        <p:style>
+          <a:lnRef idx="1">
+            <a:schemeClr val="accent3"/>
+          </a:lnRef>
+          <a:fillRef idx="2">
+            <a:schemeClr val="accent3"/>
+          </a:fillRef>
+          <a:effectRef idx="1">
+            <a:schemeClr val="accent3"/>
+          </a:effectRef>
+          <a:fontRef idx="minor">
+            <a:schemeClr val="dk1"/>
+          </a:fontRef>
+        </p:style>
+        <p:txBody>
+          <a:bodyPr rtlCol="0" anchor="ctr"/>
+          <a:lstStyle/>
+          <a:p>
+            <a:pPr algn="ctr">
+              <a:defRPr/>
+            </a:pPr>
+            <a:r>
+              <a:rPr kumimoji="1" lang="zh-CN" altLang="en-US" sz="1400" dirty="0">
+                <a:latin typeface="Heiti SC Light" charset="-122"/>
+                <a:ea typeface="Heiti SC Light" charset="-122"/>
+                <a:cs typeface="Heiti SC Light" charset="-122"/>
+              </a:rPr>
+              <a:t>执行日志</a:t>
+            </a:r>
+          </a:p>
+          <a:p>
+            <a:pPr algn="ctr">
+              <a:defRPr/>
+            </a:pPr>
+            <a:r>
+              <a:rPr kumimoji="1" lang="en-US" altLang="zh-CN" sz="1400" dirty="0">
+                <a:latin typeface="Heiti SC Light" charset="-122"/>
+                <a:ea typeface="Heiti SC Light" charset="-122"/>
+                <a:cs typeface="Heiti SC Light" charset="-122"/>
+              </a:rPr>
+              <a:t>(Log</a:t>
+            </a:r>
+            <a:r>
+              <a:rPr kumimoji="1" lang="zh-CN" altLang="en-US" sz="1400" dirty="0">
+                <a:latin typeface="Heiti SC Light" charset="-122"/>
+                <a:ea typeface="Heiti SC Light" charset="-122"/>
+                <a:cs typeface="Heiti SC Light" charset="-122"/>
+              </a:rPr>
+              <a:t>文件</a:t>
+            </a:r>
+            <a:r>
+              <a:rPr kumimoji="1" lang="en-US" altLang="zh-CN" sz="1400" dirty="0">
+                <a:latin typeface="Heiti SC Light" charset="-122"/>
+                <a:ea typeface="Heiti SC Light" charset="-122"/>
+                <a:cs typeface="Heiti SC Light" charset="-122"/>
+              </a:rPr>
+              <a:t>)</a:t>
+            </a:r>
+            <a:endParaRPr kumimoji="1" lang="zh-CN" altLang="en-US" sz="1400" dirty="0">
+              <a:latin typeface="Heiti SC Light" charset="-122"/>
+              <a:ea typeface="Heiti SC Light" charset="-122"/>
+              <a:cs typeface="Heiti SC Light" charset="-122"/>
+            </a:endParaRPr>
+          </a:p>
+        </p:txBody>
+      </p:sp>
+      <p:sp>
+        <p:nvSpPr>
+          <p:cNvPr id="102" name="圆角矩形 101"/>
+          <p:cNvSpPr/>
+          <p:nvPr/>
+        </p:nvSpPr>
+        <p:spPr>
+          <a:xfrm>
+            <a:off x="6959119" y="3361483"/>
+            <a:ext cx="1074713" cy="575198"/>
+          </a:xfrm>
+          <a:prstGeom prst="roundRect">
+            <a:avLst/>
+          </a:prstGeom>
+          <a:solidFill>
+            <a:srgbClr val="58B8D1"/>
+          </a:solidFill>
+        </p:spPr>
+        <p:style>
+          <a:lnRef idx="0">
+            <a:schemeClr val="accent1"/>
+          </a:lnRef>
+          <a:fillRef idx="3">
+            <a:schemeClr val="accent1"/>
+          </a:fillRef>
+          <a:effectRef idx="3">
+            <a:schemeClr val="accent1"/>
+          </a:effectRef>
+          <a:fontRef idx="minor">
+            <a:schemeClr val="lt1"/>
+          </a:fontRef>
+        </p:style>
+        <p:txBody>
+          <a:bodyPr anchor="ctr"/>
+          <a:lstStyle/>
+          <a:p>
+            <a:pPr algn="ctr"/>
+            <a:r>
+              <a:rPr kumimoji="1" lang="zh-CN" altLang="en-US" sz="1400" dirty="0">
+                <a:latin typeface="Heiti SC Light" charset="-122"/>
+                <a:ea typeface="Heiti SC Light" charset="-122"/>
+                <a:cs typeface="Heiti SC Light" charset="-122"/>
+              </a:rPr>
+              <a:t>回调线程</a:t>
+            </a:r>
+          </a:p>
+        </p:txBody>
+      </p:sp>
+      <p:cxnSp>
+        <p:nvCxnSpPr>
+          <p:cNvPr id="118" name="直线箭头连接符 117"/>
+          <p:cNvCxnSpPr/>
+          <p:nvPr/>
+        </p:nvCxnSpPr>
+        <p:spPr>
+          <a:xfrm flipH="1">
+            <a:off x="9337243" y="2378430"/>
+            <a:ext cx="366394" cy="3349"/>
+          </a:xfrm>
+          <a:prstGeom prst="straightConnector1">
+            <a:avLst/>
+          </a:prstGeom>
+          <a:ln w="28575">
+            <a:prstDash val="sysDash"/>
+            <a:headEnd type="none" w="med" len="med"/>
+            <a:tailEnd type="arrow" w="med" len="med"/>
+          </a:ln>
+        </p:spPr>
+        <p:style>
+          <a:lnRef idx="2">
+            <a:schemeClr val="accent1"/>
+          </a:lnRef>
+          <a:fillRef idx="0">
+            <a:schemeClr val="accent1"/>
+          </a:fillRef>
+          <a:effectRef idx="1">
+            <a:schemeClr val="accent1"/>
+          </a:effectRef>
+          <a:fontRef idx="minor">
+            <a:schemeClr val="tx1"/>
+          </a:fontRef>
+        </p:style>
+      </p:cxnSp>
+      <p:cxnSp>
+        <p:nvCxnSpPr>
+          <p:cNvPr id="120" name="直线箭头连接符 119"/>
+          <p:cNvCxnSpPr/>
+          <p:nvPr/>
+        </p:nvCxnSpPr>
+        <p:spPr>
+          <a:xfrm flipH="1">
+            <a:off x="9337243" y="3661114"/>
+            <a:ext cx="366394" cy="3349"/>
+          </a:xfrm>
+          <a:prstGeom prst="straightConnector1">
+            <a:avLst/>
+          </a:prstGeom>
+          <a:ln w="28575">
+            <a:prstDash val="sysDash"/>
+            <a:headEnd type="none" w="med" len="med"/>
+            <a:tailEnd type="arrow" w="med" len="med"/>
+          </a:ln>
+        </p:spPr>
+        <p:style>
+          <a:lnRef idx="2">
+            <a:schemeClr val="accent1"/>
+          </a:lnRef>
+          <a:fillRef idx="0">
+            <a:schemeClr val="accent1"/>
+          </a:fillRef>
+          <a:effectRef idx="1">
+            <a:schemeClr val="accent1"/>
+          </a:effectRef>
+          <a:fontRef idx="minor">
+            <a:schemeClr val="tx1"/>
+          </a:fontRef>
+        </p:style>
+      </p:cxnSp>
+      <p:sp>
+        <p:nvSpPr>
+          <p:cNvPr id="121" name="可选流程 120"/>
+          <p:cNvSpPr/>
+          <p:nvPr/>
+        </p:nvSpPr>
+        <p:spPr>
+          <a:xfrm>
+            <a:off x="4275442" y="2073176"/>
+            <a:ext cx="1654126" cy="582276"/>
+          </a:xfrm>
+          <a:prstGeom prst="flowChartAlternateProcess">
+            <a:avLst/>
+          </a:prstGeom>
+          <a:solidFill>
+            <a:srgbClr val="6095C9"/>
+          </a:solidFill>
+        </p:spPr>
+        <p:style>
+          <a:lnRef idx="0">
+            <a:schemeClr val="accent1"/>
+          </a:lnRef>
+          <a:fillRef idx="3">
+            <a:schemeClr val="accent1"/>
+          </a:fillRef>
+          <a:effectRef idx="3">
+            <a:schemeClr val="accent1"/>
+          </a:effectRef>
+          <a:fontRef idx="minor">
+            <a:schemeClr val="lt1"/>
+          </a:fontRef>
+        </p:style>
+        <p:txBody>
+          <a:bodyPr anchor="ctr"/>
+          <a:lstStyle/>
+          <a:p>
+            <a:pPr algn="ctr">
+              <a:defRPr/>
+            </a:pPr>
+            <a:r>
+              <a:rPr kumimoji="1" lang="en-US" altLang="zh-CN" sz="1400" dirty="0">
+                <a:latin typeface="Heiti SC Light" charset="-122"/>
+                <a:ea typeface="Heiti SC Light" charset="-122"/>
+                <a:cs typeface="Heiti SC Light" charset="-122"/>
+              </a:rPr>
+              <a:t>Rolling</a:t>
+            </a:r>
+            <a:r>
+              <a:rPr kumimoji="1" lang="zh-CN" altLang="en-US" sz="1400" dirty="0">
+                <a:latin typeface="Heiti SC Light" charset="-122"/>
+                <a:ea typeface="Heiti SC Light" charset="-122"/>
+                <a:cs typeface="Heiti SC Light" charset="-122"/>
+              </a:rPr>
+              <a:t>日志</a:t>
+            </a:r>
+          </a:p>
+          <a:p>
+            <a:pPr algn="ctr">
+              <a:defRPr/>
+            </a:pPr>
+            <a:r>
+              <a:rPr kumimoji="1" lang="en-US" altLang="zh-CN" sz="1400" dirty="0">
+                <a:latin typeface="Heiti SC Light" charset="-122"/>
+                <a:ea typeface="Heiti SC Light" charset="-122"/>
+                <a:cs typeface="Heiti SC Light" charset="-122"/>
+              </a:rPr>
+              <a:t>(</a:t>
+            </a:r>
+            <a:r>
+              <a:rPr kumimoji="1" lang="zh-CN" altLang="en-US" sz="1400" dirty="0">
+                <a:latin typeface="Heiti SC Light" charset="-122"/>
+                <a:ea typeface="Heiti SC Light" charset="-122"/>
+                <a:cs typeface="Heiti SC Light" charset="-122"/>
+              </a:rPr>
+              <a:t>实时</a:t>
+            </a:r>
+            <a:r>
+              <a:rPr kumimoji="1" lang="en-US" altLang="zh-CN" sz="1400" dirty="0">
+                <a:latin typeface="Heiti SC Light" charset="-122"/>
+                <a:ea typeface="Heiti SC Light" charset="-122"/>
+                <a:cs typeface="Heiti SC Light" charset="-122"/>
+              </a:rPr>
+              <a:t>)</a:t>
+            </a:r>
+            <a:endParaRPr kumimoji="1" lang="zh-CN" altLang="en-US" sz="1400" dirty="0">
+              <a:latin typeface="Heiti SC Light" charset="-122"/>
+              <a:ea typeface="Heiti SC Light" charset="-122"/>
+              <a:cs typeface="Heiti SC Light" charset="-122"/>
+            </a:endParaRPr>
+          </a:p>
+        </p:txBody>
+      </p:sp>
+      <p:sp>
+        <p:nvSpPr>
+          <p:cNvPr id="122" name="可选流程 121"/>
+          <p:cNvSpPr/>
+          <p:nvPr/>
+        </p:nvSpPr>
+        <p:spPr>
+          <a:xfrm>
+            <a:off x="6959118" y="2073918"/>
+            <a:ext cx="1074713" cy="580685"/>
+          </a:xfrm>
+          <a:prstGeom prst="flowChartAlternateProcess">
+            <a:avLst/>
+          </a:prstGeom>
+          <a:solidFill>
+            <a:srgbClr val="6095C9"/>
+          </a:solidFill>
+        </p:spPr>
+        <p:style>
+          <a:lnRef idx="0">
+            <a:schemeClr val="accent1"/>
+          </a:lnRef>
+          <a:fillRef idx="3">
+            <a:schemeClr val="accent1"/>
+          </a:fillRef>
+          <a:effectRef idx="3">
+            <a:schemeClr val="accent1"/>
+          </a:effectRef>
+          <a:fontRef idx="minor">
+            <a:schemeClr val="lt1"/>
+          </a:fontRef>
+        </p:style>
+        <p:txBody>
+          <a:bodyPr anchor="ctr"/>
+          <a:lstStyle/>
+          <a:p>
+            <a:pPr algn="ctr">
+              <a:defRPr/>
+            </a:pPr>
+            <a:r>
+              <a:rPr kumimoji="1" lang="zh-CN" altLang="en-US" sz="1400" dirty="0">
+                <a:latin typeface="Heiti SC Light" charset="-122"/>
+                <a:ea typeface="Heiti SC Light" charset="-122"/>
+                <a:cs typeface="Heiti SC Light" charset="-122"/>
+              </a:rPr>
+              <a:t>日志</a:t>
+            </a:r>
+            <a:r>
+              <a:rPr kumimoji="1" lang="zh-CN" altLang="en-US" sz="1400" dirty="0" smtClean="0">
+                <a:latin typeface="Heiti SC Light" charset="-122"/>
+                <a:ea typeface="Heiti SC Light" charset="-122"/>
+                <a:cs typeface="Heiti SC Light" charset="-122"/>
+              </a:rPr>
+              <a:t>服务</a:t>
+            </a:r>
+            <a:endParaRPr kumimoji="1" lang="zh-CN" altLang="en-US" sz="1400" dirty="0">
+              <a:latin typeface="Heiti SC Light" charset="-122"/>
+              <a:ea typeface="Heiti SC Light" charset="-122"/>
+              <a:cs typeface="Heiti SC Light" charset="-122"/>
+            </a:endParaRPr>
+          </a:p>
+        </p:txBody>
+      </p:sp>
+      <p:sp>
+        <p:nvSpPr>
+          <p:cNvPr id="2" name="矩形 1"/>
+          <p:cNvSpPr/>
+          <p:nvPr/>
+        </p:nvSpPr>
+        <p:spPr>
+          <a:xfrm>
+            <a:off x="4540885" y="5792470"/>
+            <a:ext cx="4310380" cy="521970"/>
+          </a:xfrm>
+          <a:prstGeom prst="rect">
+            <a:avLst/>
+          </a:prstGeom>
+        </p:spPr>
+        <p:txBody>
+          <a:bodyPr wrap="square">
+            <a:spAutoFit/>
+          </a:bodyPr>
+          <a:lstStyle/>
+          <a:p>
+            <a:pPr algn="ctr"/>
+            <a:r>
+              <a:rPr lang="en-US" altLang="zh-CN" sz="2800" dirty="0">
+                <a:latin typeface="Heiti SC Light" charset="-122"/>
+                <a:ea typeface="Heiti SC Light" charset="-122"/>
+                <a:cs typeface="Heiti SC Light" charset="-122"/>
+              </a:rPr>
+              <a:t>XXL-JOB</a:t>
+            </a:r>
+            <a:r>
+              <a:rPr lang="zh-CN" altLang="en-US" sz="2800" dirty="0">
+                <a:latin typeface="Heiti SC Light" charset="-122"/>
+                <a:ea typeface="Heiti SC Light" charset="-122"/>
+                <a:cs typeface="Heiti SC Light" charset="-122"/>
+              </a:rPr>
+              <a:t>架构图 </a:t>
+            </a:r>
+            <a:r>
+              <a:rPr lang="en-US" altLang="zh-CN" sz="2800" dirty="0" smtClean="0">
+                <a:latin typeface="Heiti SC Light" charset="-122"/>
+                <a:ea typeface="Heiti SC Light" charset="-122"/>
+                <a:cs typeface="Heiti SC Light" charset="-122"/>
+              </a:rPr>
+              <a:t>v2.1.0</a:t>
+            </a:r>
+            <a:endParaRPr lang="en-US" altLang="zh-CN" sz="2800" dirty="0">
+              <a:latin typeface="Heiti SC Light" charset="-122"/>
+              <a:ea typeface="Heiti SC Light" charset="-122"/>
+              <a:cs typeface="Heiti SC Light" charset="-122"/>
+            </a:endParaRPr>
+          </a:p>
+        </p:txBody>
+      </p:sp>
+      <p:sp>
+        <p:nvSpPr>
+          <p:cNvPr id="3" name="圆角矩形 2"/>
+          <p:cNvSpPr/>
+          <p:nvPr/>
+        </p:nvSpPr>
+        <p:spPr>
+          <a:xfrm>
+            <a:off x="4271056" y="997071"/>
+            <a:ext cx="1672112" cy="586589"/>
+          </a:xfrm>
+          <a:prstGeom prst="roundRect">
+            <a:avLst/>
+          </a:prstGeom>
+        </p:spPr>
+        <p:style>
+          <a:lnRef idx="0">
+            <a:schemeClr val="accent2"/>
+          </a:lnRef>
+          <a:fillRef idx="3">
+            <a:schemeClr val="accent2"/>
+          </a:fillRef>
+          <a:effectRef idx="3">
+            <a:schemeClr val="accent2"/>
+          </a:effectRef>
+          <a:fontRef idx="minor">
+            <a:schemeClr val="lt1"/>
+          </a:fontRef>
+        </p:style>
+        <p:txBody>
+          <a:bodyPr anchor="ctr"/>
+          <a:lstStyle/>
+          <a:p>
+            <a:pPr algn="ctr">
+              <a:defRPr/>
+            </a:pPr>
+            <a:r>
+              <a:rPr kumimoji="1" lang="zh-CN" altLang="en-US" sz="1400" dirty="0" smtClean="0">
+                <a:latin typeface="Heiti SC Light" charset="-122"/>
+                <a:ea typeface="Heiti SC Light" charset="-122"/>
+                <a:cs typeface="Heiti SC Light" charset="-122"/>
+              </a:rPr>
+              <a:t>调度器</a:t>
+            </a:r>
+          </a:p>
+          <a:p>
+            <a:pPr algn="ctr">
+              <a:defRPr/>
+            </a:pPr>
+            <a:r>
+              <a:rPr kumimoji="1" lang="en-US" altLang="zh-CN" sz="1400" dirty="0">
+                <a:latin typeface="Heiti SC Light" charset="-122"/>
+                <a:ea typeface="Heiti SC Light" charset="-122"/>
+                <a:cs typeface="Heiti SC Light" charset="-122"/>
+              </a:rPr>
+              <a:t>(timewheel)</a:t>
+            </a:r>
+            <a:endParaRPr kumimoji="1" lang="zh-CN" altLang="en-US" sz="1400" dirty="0" smtClean="0">
+              <a:latin typeface="Heiti SC Light" charset="-122"/>
+              <a:ea typeface="Heiti SC Light" charset="-122"/>
+              <a:cs typeface="Heiti SC Light" charset="-122"/>
+            </a:endParaRPr>
+          </a:p>
+        </p:txBody>
+      </p:sp>
+      <p:cxnSp>
+        <p:nvCxnSpPr>
+          <p:cNvPr id="55" name="直线箭头连接符 54"/>
+          <p:cNvCxnSpPr/>
+          <p:nvPr/>
+        </p:nvCxnSpPr>
+        <p:spPr>
+          <a:xfrm rot="10800000" flipH="1">
+            <a:off x="5945824" y="1334309"/>
+            <a:ext cx="893129" cy="645"/>
+          </a:xfrm>
+          <a:prstGeom prst="straightConnector1">
+            <a:avLst/>
+          </a:prstGeom>
+          <a:ln w="28575">
+            <a:prstDash val="sysDash"/>
+            <a:headEnd type="none" w="med" len="med"/>
+            <a:tailEnd type="arrow" w="med" len="med"/>
+          </a:ln>
+        </p:spPr>
+        <p:style>
+          <a:lnRef idx="2">
+            <a:schemeClr val="accent1"/>
+          </a:lnRef>
+          <a:fillRef idx="0">
+            <a:schemeClr val="accent1"/>
+          </a:fillRef>
+          <a:effectRef idx="1">
+            <a:schemeClr val="accent1"/>
+          </a:effectRef>
+          <a:fontRef idx="minor">
+            <a:schemeClr val="tx1"/>
+          </a:fontRef>
+        </p:style>
+      </p:cxnSp>
+    </p:spTree>
+    <p:extLst>
+      <p:ext uri="{BB962C8B-B14F-4D97-AF65-F5344CB8AC3E}">
+        <p14:creationId xmlns:p14="http://schemas.microsoft.com/office/powerpoint/2010/main" val="1453474056"/>
+      </p:ext>
+    </p:extLst>
+  </p:cSld>
+  <p:clrMapOvr>
+    <a:masterClrMapping/>
+  </p:clrMapOvr>
+  <p:timing>
+    <p:tnLst>
+      <p:par>
+        <p:cTn id="1" dur="indefinite" restart="never" nodeType="tmRoot"/>
+      </p:par>
+    </p:tnLst>
+  </p:timing>
+</p:sld>
+</file>
+
 <file path=ppt/slides/slide2.xml><?xml version="1.0" encoding="utf-8"?>
 <p:sld xmlns:a="http://schemas.openxmlformats.org/drawingml/2006/main" xmlns:r="http://schemas.openxmlformats.org/officeDocument/2006/relationships" xmlns:p="http://schemas.openxmlformats.org/presentationml/2006/main">
   <p:cSld>
@@ -20417,21 +23298,8 @@
                 <a:ea typeface="Heiti SC Light" charset="-122"/>
                 <a:cs typeface="Heiti SC Light" charset="-122"/>
               </a:rPr>
-              <a:t>注册</a:t>
-            </a:r>
-            <a:r>
-              <a:rPr kumimoji="1" lang="zh-CN" altLang="en-US" sz="1400" dirty="0" smtClean="0">
-                <a:latin typeface="Heiti SC Light" charset="-122"/>
-                <a:ea typeface="Heiti SC Light" charset="-122"/>
-                <a:cs typeface="Heiti SC Light" charset="-122"/>
-              </a:rPr>
-              <a:t>服务</a:t>
-            </a:r>
-            <a:endParaRPr kumimoji="1" lang="zh-CN" altLang="en-US" sz="1400" dirty="0" smtClean="0">
-              <a:latin typeface="Heiti SC Light" charset="-122"/>
-              <a:ea typeface="Heiti SC Light" charset="-122"/>
-              <a:cs typeface="Heiti SC Light" charset="-122"/>
-            </a:endParaRPr>
+              <a:t>注册服务</a:t>
+            </a:r>
           </a:p>
         </p:txBody>
       </p:sp>
@@ -21169,11 +24037,6 @@
               </a:rPr>
               <a:t>服务</a:t>
             </a:r>
-            <a:endParaRPr kumimoji="1" lang="zh-CN" altLang="en-US" sz="1400" dirty="0" smtClean="0">
-              <a:latin typeface="Heiti SC Light" charset="-122"/>
-              <a:ea typeface="Heiti SC Light" charset="-122"/>
-              <a:cs typeface="Heiti SC Light" charset="-122"/>
-            </a:endParaRPr>
           </a:p>
         </p:txBody>
       </p:sp>
@@ -21819,15 +24682,7 @@
                 <a:ea typeface="Heiti SC Light" charset="-122"/>
                 <a:cs typeface="Heiti SC Light" charset="-122"/>
               </a:rPr>
-              <a:t>执行器</a:t>
-            </a:r>
-            <a:r>
-              <a:rPr kumimoji="1" lang="zh-CN" altLang="en-US" sz="1400" dirty="0" smtClean="0">
-                <a:latin typeface="Heiti SC Light" charset="-122"/>
-                <a:ea typeface="Heiti SC Light" charset="-122"/>
-                <a:cs typeface="Heiti SC Light" charset="-122"/>
-              </a:rPr>
-              <a:t>服务</a:t>
+              <a:t>执行器服务</a:t>
             </a:r>
             <a:endParaRPr kumimoji="1" lang="zh-CN" altLang="en-US" sz="1400" dirty="0">
               <a:latin typeface="Heiti SC Light" charset="-122"/>
@@ -22383,11 +25238,6 @@
               </a:rPr>
               <a:t>）</a:t>
             </a:r>
-            <a:endParaRPr kumimoji="1" lang="zh-CN" altLang="en-US" sz="1400" dirty="0" smtClean="0">
-              <a:latin typeface="Heiti SC Light" charset="-122"/>
-              <a:ea typeface="Heiti SC Light" charset="-122"/>
-              <a:cs typeface="Heiti SC Light" charset="-122"/>
-            </a:endParaRPr>
           </a:p>
         </p:txBody>
       </p:sp>

</xml_diff>